<commit_message>
Bunch of changes to capture statistics back into Cloudant
</commit_message>
<xml_diff>
--- a/public/images/age-at-home.pptx
+++ b/public/images/age-at-home.pptx
@@ -4,8 +4,12 @@
   <p:sldMasterIdLst>
     <p:sldMasterId id="2147483648" r:id="rId1"/>
   </p:sldMasterIdLst>
+  <p:notesMasterIdLst>
+    <p:notesMasterId r:id="rId4"/>
+  </p:notesMasterIdLst>
   <p:sldIdLst>
     <p:sldId id="257" r:id="rId2"/>
+    <p:sldId id="258" r:id="rId3"/>
   </p:sldIdLst>
   <p:sldSz cx="12192000" cy="6858000"/>
   <p:notesSz cx="6858000" cy="9144000"/>
@@ -112,6 +116,638 @@
 </p:presentation>
 </file>
 
+<file path=ppt/notesMasters/notesMaster1.xml><?xml version="1.0" encoding="utf-8"?>
+<p:notesMaster xmlns:a="http://schemas.openxmlformats.org/drawingml/2006/main" xmlns:r="http://schemas.openxmlformats.org/officeDocument/2006/relationships" xmlns:p="http://schemas.openxmlformats.org/presentationml/2006/main">
+  <p:cSld>
+    <p:bg>
+      <p:bgRef idx="1001">
+        <a:schemeClr val="bg1"/>
+      </p:bgRef>
+    </p:bg>
+    <p:spTree>
+      <p:nvGrpSpPr>
+        <p:cNvPr id="1" name=""/>
+        <p:cNvGrpSpPr/>
+        <p:nvPr/>
+      </p:nvGrpSpPr>
+      <p:grpSpPr>
+        <a:xfrm>
+          <a:off x="0" y="0"/>
+          <a:ext cx="0" cy="0"/>
+          <a:chOff x="0" y="0"/>
+          <a:chExt cx="0" cy="0"/>
+        </a:xfrm>
+      </p:grpSpPr>
+      <p:sp>
+        <p:nvSpPr>
+          <p:cNvPr id="2" name="Header Placeholder 1"/>
+          <p:cNvSpPr>
+            <a:spLocks noGrp="1"/>
+          </p:cNvSpPr>
+          <p:nvPr>
+            <p:ph type="hdr" sz="quarter"/>
+          </p:nvPr>
+        </p:nvSpPr>
+        <p:spPr>
+          <a:xfrm>
+            <a:off x="0" y="0"/>
+            <a:ext cx="2971800" cy="458788"/>
+          </a:xfrm>
+          <a:prstGeom prst="rect">
+            <a:avLst/>
+          </a:prstGeom>
+        </p:spPr>
+        <p:txBody>
+          <a:bodyPr vert="horz" lIns="91440" tIns="45720" rIns="91440" bIns="45720" rtlCol="0"/>
+          <a:lstStyle>
+            <a:lvl1pPr algn="l">
+              <a:defRPr sz="1200"/>
+            </a:lvl1pPr>
+          </a:lstStyle>
+          <a:p>
+            <a:endParaRPr lang="en-US"/>
+          </a:p>
+        </p:txBody>
+      </p:sp>
+      <p:sp>
+        <p:nvSpPr>
+          <p:cNvPr id="3" name="Date Placeholder 2"/>
+          <p:cNvSpPr>
+            <a:spLocks noGrp="1"/>
+          </p:cNvSpPr>
+          <p:nvPr>
+            <p:ph type="dt" idx="1"/>
+          </p:nvPr>
+        </p:nvSpPr>
+        <p:spPr>
+          <a:xfrm>
+            <a:off x="3884613" y="0"/>
+            <a:ext cx="2971800" cy="458788"/>
+          </a:xfrm>
+          <a:prstGeom prst="rect">
+            <a:avLst/>
+          </a:prstGeom>
+        </p:spPr>
+        <p:txBody>
+          <a:bodyPr vert="horz" lIns="91440" tIns="45720" rIns="91440" bIns="45720" rtlCol="0"/>
+          <a:lstStyle>
+            <a:lvl1pPr algn="r">
+              <a:defRPr sz="1200"/>
+            </a:lvl1pPr>
+          </a:lstStyle>
+          <a:p>
+            <a:fld id="{6DAC13B1-5F83-2B4E-81BC-D17127356EF0}" type="datetimeFigureOut">
+              <a:rPr lang="en-US" smtClean="0"/>
+              <a:t>4/22/16</a:t>
+            </a:fld>
+            <a:endParaRPr lang="en-US"/>
+          </a:p>
+        </p:txBody>
+      </p:sp>
+      <p:sp>
+        <p:nvSpPr>
+          <p:cNvPr id="4" name="Slide Image Placeholder 3"/>
+          <p:cNvSpPr>
+            <a:spLocks noGrp="1" noRot="1" noChangeAspect="1"/>
+          </p:cNvSpPr>
+          <p:nvPr>
+            <p:ph type="sldImg" idx="2"/>
+          </p:nvPr>
+        </p:nvSpPr>
+        <p:spPr>
+          <a:xfrm>
+            <a:off x="685800" y="1143000"/>
+            <a:ext cx="5486400" cy="3086100"/>
+          </a:xfrm>
+          <a:prstGeom prst="rect">
+            <a:avLst/>
+          </a:prstGeom>
+          <a:noFill/>
+          <a:ln w="12700">
+            <a:solidFill>
+              <a:prstClr val="black"/>
+            </a:solidFill>
+          </a:ln>
+        </p:spPr>
+        <p:txBody>
+          <a:bodyPr vert="horz" lIns="91440" tIns="45720" rIns="91440" bIns="45720" rtlCol="0" anchor="ctr"/>
+          <a:lstStyle/>
+          <a:p>
+            <a:endParaRPr lang="en-US"/>
+          </a:p>
+        </p:txBody>
+      </p:sp>
+      <p:sp>
+        <p:nvSpPr>
+          <p:cNvPr id="5" name="Notes Placeholder 4"/>
+          <p:cNvSpPr>
+            <a:spLocks noGrp="1"/>
+          </p:cNvSpPr>
+          <p:nvPr>
+            <p:ph type="body" sz="quarter" idx="3"/>
+          </p:nvPr>
+        </p:nvSpPr>
+        <p:spPr>
+          <a:xfrm>
+            <a:off x="685800" y="4400550"/>
+            <a:ext cx="5486400" cy="3600450"/>
+          </a:xfrm>
+          <a:prstGeom prst="rect">
+            <a:avLst/>
+          </a:prstGeom>
+        </p:spPr>
+        <p:txBody>
+          <a:bodyPr vert="horz" lIns="91440" tIns="45720" rIns="91440" bIns="45720" rtlCol="0"/>
+          <a:lstStyle/>
+          <a:p>
+            <a:pPr lvl="0"/>
+            <a:r>
+              <a:rPr lang="en-US" smtClean="0"/>
+              <a:t>Click to edit Master text styles</a:t>
+            </a:r>
+          </a:p>
+          <a:p>
+            <a:pPr lvl="1"/>
+            <a:r>
+              <a:rPr lang="en-US" smtClean="0"/>
+              <a:t>Second level</a:t>
+            </a:r>
+          </a:p>
+          <a:p>
+            <a:pPr lvl="2"/>
+            <a:r>
+              <a:rPr lang="en-US" smtClean="0"/>
+              <a:t>Third level</a:t>
+            </a:r>
+          </a:p>
+          <a:p>
+            <a:pPr lvl="3"/>
+            <a:r>
+              <a:rPr lang="en-US" smtClean="0"/>
+              <a:t>Fourth level</a:t>
+            </a:r>
+          </a:p>
+          <a:p>
+            <a:pPr lvl="4"/>
+            <a:r>
+              <a:rPr lang="en-US" smtClean="0"/>
+              <a:t>Fifth level</a:t>
+            </a:r>
+            <a:endParaRPr lang="en-US"/>
+          </a:p>
+        </p:txBody>
+      </p:sp>
+      <p:sp>
+        <p:nvSpPr>
+          <p:cNvPr id="6" name="Footer Placeholder 5"/>
+          <p:cNvSpPr>
+            <a:spLocks noGrp="1"/>
+          </p:cNvSpPr>
+          <p:nvPr>
+            <p:ph type="ftr" sz="quarter" idx="4"/>
+          </p:nvPr>
+        </p:nvSpPr>
+        <p:spPr>
+          <a:xfrm>
+            <a:off x="0" y="8685213"/>
+            <a:ext cx="2971800" cy="458787"/>
+          </a:xfrm>
+          <a:prstGeom prst="rect">
+            <a:avLst/>
+          </a:prstGeom>
+        </p:spPr>
+        <p:txBody>
+          <a:bodyPr vert="horz" lIns="91440" tIns="45720" rIns="91440" bIns="45720" rtlCol="0" anchor="b"/>
+          <a:lstStyle>
+            <a:lvl1pPr algn="l">
+              <a:defRPr sz="1200"/>
+            </a:lvl1pPr>
+          </a:lstStyle>
+          <a:p>
+            <a:endParaRPr lang="en-US"/>
+          </a:p>
+        </p:txBody>
+      </p:sp>
+      <p:sp>
+        <p:nvSpPr>
+          <p:cNvPr id="7" name="Slide Number Placeholder 6"/>
+          <p:cNvSpPr>
+            <a:spLocks noGrp="1"/>
+          </p:cNvSpPr>
+          <p:nvPr>
+            <p:ph type="sldNum" sz="quarter" idx="5"/>
+          </p:nvPr>
+        </p:nvSpPr>
+        <p:spPr>
+          <a:xfrm>
+            <a:off x="3884613" y="8685213"/>
+            <a:ext cx="2971800" cy="458787"/>
+          </a:xfrm>
+          <a:prstGeom prst="rect">
+            <a:avLst/>
+          </a:prstGeom>
+        </p:spPr>
+        <p:txBody>
+          <a:bodyPr vert="horz" lIns="91440" tIns="45720" rIns="91440" bIns="45720" rtlCol="0" anchor="b"/>
+          <a:lstStyle>
+            <a:lvl1pPr algn="r">
+              <a:defRPr sz="1200"/>
+            </a:lvl1pPr>
+          </a:lstStyle>
+          <a:p>
+            <a:fld id="{CF6469C4-C18F-0042-8341-BAD8769772A1}" type="slidenum">
+              <a:rPr lang="en-US" smtClean="0"/>
+              <a:t>‹#›</a:t>
+            </a:fld>
+            <a:endParaRPr lang="en-US"/>
+          </a:p>
+        </p:txBody>
+      </p:sp>
+    </p:spTree>
+    <p:extLst>
+      <p:ext uri="{BB962C8B-B14F-4D97-AF65-F5344CB8AC3E}">
+        <p14:creationId xmlns:p14="http://schemas.microsoft.com/office/powerpoint/2010/main" val="759741694"/>
+      </p:ext>
+    </p:extLst>
+  </p:cSld>
+  <p:clrMap bg1="lt1" tx1="dk1" bg2="lt2" tx2="dk2" accent1="accent1" accent2="accent2" accent3="accent3" accent4="accent4" accent5="accent5" accent6="accent6" hlink="hlink" folHlink="folHlink"/>
+  <p:notesStyle>
+    <a:lvl1pPr marL="0" algn="l" defTabSz="914400" rtl="0" eaLnBrk="1" latinLnBrk="0" hangingPunct="1">
+      <a:defRPr sz="1200" kern="1200">
+        <a:solidFill>
+          <a:schemeClr val="tx1"/>
+        </a:solidFill>
+        <a:latin typeface="+mn-lt"/>
+        <a:ea typeface="+mn-ea"/>
+        <a:cs typeface="+mn-cs"/>
+      </a:defRPr>
+    </a:lvl1pPr>
+    <a:lvl2pPr marL="457200" algn="l" defTabSz="914400" rtl="0" eaLnBrk="1" latinLnBrk="0" hangingPunct="1">
+      <a:defRPr sz="1200" kern="1200">
+        <a:solidFill>
+          <a:schemeClr val="tx1"/>
+        </a:solidFill>
+        <a:latin typeface="+mn-lt"/>
+        <a:ea typeface="+mn-ea"/>
+        <a:cs typeface="+mn-cs"/>
+      </a:defRPr>
+    </a:lvl2pPr>
+    <a:lvl3pPr marL="914400" algn="l" defTabSz="914400" rtl="0" eaLnBrk="1" latinLnBrk="0" hangingPunct="1">
+      <a:defRPr sz="1200" kern="1200">
+        <a:solidFill>
+          <a:schemeClr val="tx1"/>
+        </a:solidFill>
+        <a:latin typeface="+mn-lt"/>
+        <a:ea typeface="+mn-ea"/>
+        <a:cs typeface="+mn-cs"/>
+      </a:defRPr>
+    </a:lvl3pPr>
+    <a:lvl4pPr marL="1371600" algn="l" defTabSz="914400" rtl="0" eaLnBrk="1" latinLnBrk="0" hangingPunct="1">
+      <a:defRPr sz="1200" kern="1200">
+        <a:solidFill>
+          <a:schemeClr val="tx1"/>
+        </a:solidFill>
+        <a:latin typeface="+mn-lt"/>
+        <a:ea typeface="+mn-ea"/>
+        <a:cs typeface="+mn-cs"/>
+      </a:defRPr>
+    </a:lvl4pPr>
+    <a:lvl5pPr marL="1828800" algn="l" defTabSz="914400" rtl="0" eaLnBrk="1" latinLnBrk="0" hangingPunct="1">
+      <a:defRPr sz="1200" kern="1200">
+        <a:solidFill>
+          <a:schemeClr val="tx1"/>
+        </a:solidFill>
+        <a:latin typeface="+mn-lt"/>
+        <a:ea typeface="+mn-ea"/>
+        <a:cs typeface="+mn-cs"/>
+      </a:defRPr>
+    </a:lvl5pPr>
+    <a:lvl6pPr marL="2286000" algn="l" defTabSz="914400" rtl="0" eaLnBrk="1" latinLnBrk="0" hangingPunct="1">
+      <a:defRPr sz="1200" kern="1200">
+        <a:solidFill>
+          <a:schemeClr val="tx1"/>
+        </a:solidFill>
+        <a:latin typeface="+mn-lt"/>
+        <a:ea typeface="+mn-ea"/>
+        <a:cs typeface="+mn-cs"/>
+      </a:defRPr>
+    </a:lvl6pPr>
+    <a:lvl7pPr marL="2743200" algn="l" defTabSz="914400" rtl="0" eaLnBrk="1" latinLnBrk="0" hangingPunct="1">
+      <a:defRPr sz="1200" kern="1200">
+        <a:solidFill>
+          <a:schemeClr val="tx1"/>
+        </a:solidFill>
+        <a:latin typeface="+mn-lt"/>
+        <a:ea typeface="+mn-ea"/>
+        <a:cs typeface="+mn-cs"/>
+      </a:defRPr>
+    </a:lvl7pPr>
+    <a:lvl8pPr marL="3200400" algn="l" defTabSz="914400" rtl="0" eaLnBrk="1" latinLnBrk="0" hangingPunct="1">
+      <a:defRPr sz="1200" kern="1200">
+        <a:solidFill>
+          <a:schemeClr val="tx1"/>
+        </a:solidFill>
+        <a:latin typeface="+mn-lt"/>
+        <a:ea typeface="+mn-ea"/>
+        <a:cs typeface="+mn-cs"/>
+      </a:defRPr>
+    </a:lvl8pPr>
+    <a:lvl9pPr marL="3657600" algn="l" defTabSz="914400" rtl="0" eaLnBrk="1" latinLnBrk="0" hangingPunct="1">
+      <a:defRPr sz="1200" kern="1200">
+        <a:solidFill>
+          <a:schemeClr val="tx1"/>
+        </a:solidFill>
+        <a:latin typeface="+mn-lt"/>
+        <a:ea typeface="+mn-ea"/>
+        <a:cs typeface="+mn-cs"/>
+      </a:defRPr>
+    </a:lvl9pPr>
+  </p:notesStyle>
+</p:notesMaster>
+</file>
+
+<file path=ppt/notesSlides/notesSlide1.xml><?xml version="1.0" encoding="utf-8"?>
+<p:notes xmlns:a="http://schemas.openxmlformats.org/drawingml/2006/main" xmlns:r="http://schemas.openxmlformats.org/officeDocument/2006/relationships" xmlns:p="http://schemas.openxmlformats.org/presentationml/2006/main">
+  <p:cSld>
+    <p:spTree>
+      <p:nvGrpSpPr>
+        <p:cNvPr id="1" name=""/>
+        <p:cNvGrpSpPr/>
+        <p:nvPr/>
+      </p:nvGrpSpPr>
+      <p:grpSpPr>
+        <a:xfrm>
+          <a:off x="0" y="0"/>
+          <a:ext cx="0" cy="0"/>
+          <a:chOff x="0" y="0"/>
+          <a:chExt cx="0" cy="0"/>
+        </a:xfrm>
+      </p:grpSpPr>
+      <p:sp>
+        <p:nvSpPr>
+          <p:cNvPr id="2" name="Slide Image Placeholder 1"/>
+          <p:cNvSpPr>
+            <a:spLocks noGrp="1" noRot="1" noChangeAspect="1"/>
+          </p:cNvSpPr>
+          <p:nvPr>
+            <p:ph type="sldImg"/>
+          </p:nvPr>
+        </p:nvSpPr>
+        <p:spPr/>
+      </p:sp>
+      <p:sp>
+        <p:nvSpPr>
+          <p:cNvPr id="3" name="Notes Placeholder 2"/>
+          <p:cNvSpPr>
+            <a:spLocks noGrp="1"/>
+          </p:cNvSpPr>
+          <p:nvPr>
+            <p:ph type="body" idx="1"/>
+          </p:nvPr>
+        </p:nvSpPr>
+        <p:spPr/>
+        <p:txBody>
+          <a:bodyPr/>
+          <a:lstStyle/>
+          <a:p>
+            <a:r>
+              <a:rPr lang="en-US" sz="1200" u="none" kern="1200" dirty="0" smtClean="0">
+                <a:solidFill>
+                  <a:schemeClr val="tx1"/>
+                </a:solidFill>
+                <a:latin typeface="+mn-lt"/>
+                <a:ea typeface="+mn-ea"/>
+                <a:cs typeface="+mn-cs"/>
+                <a:hlinkClick r:id=""/>
+              </a:rPr>
+              <a:t>AlchemyAPI Language Analysis</a:t>
+            </a:r>
+          </a:p>
+          <a:p>
+            <a:r>
+              <a:rPr lang="en-US" sz="1200" u="none" kern="1200" dirty="0" smtClean="0">
+                <a:solidFill>
+                  <a:schemeClr val="tx1"/>
+                </a:solidFill>
+                <a:latin typeface="+mn-lt"/>
+                <a:ea typeface="+mn-ea"/>
+                <a:cs typeface="+mn-cs"/>
+                <a:hlinkClick r:id=""/>
+              </a:rPr>
+              <a:t>Entity Extraction</a:t>
+            </a:r>
+          </a:p>
+          <a:p>
+            <a:r>
+              <a:rPr lang="en-US" sz="1200" u="none" kern="1200" dirty="0" smtClean="0">
+                <a:solidFill>
+                  <a:schemeClr val="tx1"/>
+                </a:solidFill>
+                <a:latin typeface="+mn-lt"/>
+                <a:ea typeface="+mn-ea"/>
+                <a:cs typeface="+mn-cs"/>
+                <a:hlinkClick r:id="rId3"/>
+              </a:rPr>
+              <a:t>Sentiment Analysis</a:t>
+            </a:r>
+          </a:p>
+          <a:p>
+            <a:r>
+              <a:rPr lang="en-US" sz="1200" u="none" kern="1200" dirty="0" smtClean="0">
+                <a:solidFill>
+                  <a:schemeClr val="tx1"/>
+                </a:solidFill>
+                <a:latin typeface="+mn-lt"/>
+                <a:ea typeface="+mn-ea"/>
+                <a:cs typeface="+mn-cs"/>
+                <a:hlinkClick r:id="rId4"/>
+              </a:rPr>
+              <a:t>Emotion Analysis (Beta)</a:t>
+            </a:r>
+          </a:p>
+          <a:p>
+            <a:r>
+              <a:rPr lang="en-US" sz="1200" u="none" kern="1200" dirty="0" smtClean="0">
+                <a:solidFill>
+                  <a:schemeClr val="tx1"/>
+                </a:solidFill>
+                <a:latin typeface="+mn-lt"/>
+                <a:ea typeface="+mn-ea"/>
+                <a:cs typeface="+mn-cs"/>
+                <a:hlinkClick r:id="rId5"/>
+              </a:rPr>
+              <a:t>Keyword Extraction</a:t>
+            </a:r>
+          </a:p>
+          <a:p>
+            <a:r>
+              <a:rPr lang="en-US" sz="1200" u="none" kern="1200" dirty="0" smtClean="0">
+                <a:solidFill>
+                  <a:schemeClr val="tx1"/>
+                </a:solidFill>
+                <a:latin typeface="+mn-lt"/>
+                <a:ea typeface="+mn-ea"/>
+                <a:cs typeface="+mn-cs"/>
+                <a:hlinkClick r:id="rId6"/>
+              </a:rPr>
+              <a:t>Concept Tagging</a:t>
+            </a:r>
+          </a:p>
+          <a:p>
+            <a:r>
+              <a:rPr lang="en-US" sz="1200" u="none" kern="1200" dirty="0" smtClean="0">
+                <a:solidFill>
+                  <a:schemeClr val="tx1"/>
+                </a:solidFill>
+                <a:latin typeface="+mn-lt"/>
+                <a:ea typeface="+mn-ea"/>
+                <a:cs typeface="+mn-cs"/>
+                <a:hlinkClick r:id="rId7"/>
+              </a:rPr>
+              <a:t>Relation Extraction</a:t>
+            </a:r>
+          </a:p>
+          <a:p>
+            <a:r>
+              <a:rPr lang="en-US" sz="1200" u="none" kern="1200" dirty="0" smtClean="0">
+                <a:solidFill>
+                  <a:schemeClr val="tx1"/>
+                </a:solidFill>
+                <a:latin typeface="+mn-lt"/>
+                <a:ea typeface="+mn-ea"/>
+                <a:cs typeface="+mn-cs"/>
+                <a:hlinkClick r:id="rId8"/>
+              </a:rPr>
+              <a:t>Taxonomy Classification</a:t>
+            </a:r>
+          </a:p>
+          <a:p>
+            <a:r>
+              <a:rPr lang="en-US" sz="1200" u="none" kern="1200" dirty="0" smtClean="0">
+                <a:solidFill>
+                  <a:schemeClr val="tx1"/>
+                </a:solidFill>
+                <a:latin typeface="+mn-lt"/>
+                <a:ea typeface="+mn-ea"/>
+                <a:cs typeface="+mn-cs"/>
+                <a:hlinkClick r:id="rId9"/>
+              </a:rPr>
+              <a:t>Author Extraction</a:t>
+            </a:r>
+          </a:p>
+          <a:p>
+            <a:r>
+              <a:rPr lang="en-US" sz="1200" u="none" kern="1200" dirty="0" smtClean="0">
+                <a:solidFill>
+                  <a:schemeClr val="tx1"/>
+                </a:solidFill>
+                <a:latin typeface="+mn-lt"/>
+                <a:ea typeface="+mn-ea"/>
+                <a:cs typeface="+mn-cs"/>
+                <a:hlinkClick r:id="rId10"/>
+              </a:rPr>
+              <a:t>Language Detection</a:t>
+            </a:r>
+          </a:p>
+          <a:p>
+            <a:r>
+              <a:rPr lang="en-US" sz="1200" u="none" kern="1200" dirty="0" smtClean="0">
+                <a:solidFill>
+                  <a:schemeClr val="tx1"/>
+                </a:solidFill>
+                <a:latin typeface="+mn-lt"/>
+                <a:ea typeface="+mn-ea"/>
+                <a:cs typeface="+mn-cs"/>
+                <a:hlinkClick r:id="rId11"/>
+              </a:rPr>
+              <a:t>Text Extraction</a:t>
+            </a:r>
+          </a:p>
+          <a:p>
+            <a:r>
+              <a:rPr lang="en-US" sz="1200" u="none" kern="1200" dirty="0" smtClean="0">
+                <a:solidFill>
+                  <a:schemeClr val="tx1"/>
+                </a:solidFill>
+                <a:latin typeface="+mn-lt"/>
+                <a:ea typeface="+mn-ea"/>
+                <a:cs typeface="+mn-cs"/>
+                <a:hlinkClick r:id="rId12"/>
+              </a:rPr>
+              <a:t>Microformats Parsing</a:t>
+            </a:r>
+          </a:p>
+          <a:p>
+            <a:r>
+              <a:rPr lang="en-US" sz="1200" u="none" kern="1200" dirty="0" smtClean="0">
+                <a:solidFill>
+                  <a:schemeClr val="tx1"/>
+                </a:solidFill>
+                <a:latin typeface="+mn-lt"/>
+                <a:ea typeface="+mn-ea"/>
+                <a:cs typeface="+mn-cs"/>
+                <a:hlinkClick r:id="rId13"/>
+              </a:rPr>
+              <a:t>Feed Detection</a:t>
+            </a:r>
+          </a:p>
+          <a:p>
+            <a:r>
+              <a:rPr lang="en-US" sz="1200" u="none" kern="1200" dirty="0" smtClean="0">
+                <a:solidFill>
+                  <a:schemeClr val="tx1"/>
+                </a:solidFill>
+                <a:latin typeface="+mn-lt"/>
+                <a:ea typeface="+mn-ea"/>
+                <a:cs typeface="+mn-cs"/>
+                <a:hlinkClick r:id="rId14"/>
+              </a:rPr>
+              <a:t>Linked Data Support</a:t>
+            </a:r>
+            <a:endParaRPr lang="en-US" u="none" dirty="0">
+              <a:solidFill>
+                <a:schemeClr val="tx1"/>
+              </a:solidFill>
+            </a:endParaRPr>
+          </a:p>
+        </p:txBody>
+      </p:sp>
+      <p:sp>
+        <p:nvSpPr>
+          <p:cNvPr id="4" name="Slide Number Placeholder 3"/>
+          <p:cNvSpPr>
+            <a:spLocks noGrp="1"/>
+          </p:cNvSpPr>
+          <p:nvPr>
+            <p:ph type="sldNum" sz="quarter" idx="10"/>
+          </p:nvPr>
+        </p:nvSpPr>
+        <p:spPr/>
+        <p:txBody>
+          <a:bodyPr/>
+          <a:lstStyle/>
+          <a:p>
+            <a:fld id="{11616961-398F-3B44-A9D7-9395CA3E41B3}" type="slidenum">
+              <a:rPr lang="en-US" smtClean="0"/>
+              <a:t>2</a:t>
+            </a:fld>
+            <a:endParaRPr lang="en-US"/>
+          </a:p>
+        </p:txBody>
+      </p:sp>
+    </p:spTree>
+    <p:extLst>
+      <p:ext uri="{BB962C8B-B14F-4D97-AF65-F5344CB8AC3E}">
+        <p14:creationId xmlns:p14="http://schemas.microsoft.com/office/powerpoint/2010/main" val="2123651379"/>
+      </p:ext>
+    </p:extLst>
+  </p:cSld>
+  <p:clrMapOvr>
+    <a:masterClrMapping/>
+  </p:clrMapOvr>
+</p:notes>
+</file>
+
 <file path=ppt/slideLayouts/slideLayout1.xml><?xml version="1.0" encoding="utf-8"?>
 <p:sldLayout xmlns:a="http://schemas.openxmlformats.org/drawingml/2006/main" xmlns:r="http://schemas.openxmlformats.org/officeDocument/2006/relationships" xmlns:p="http://schemas.openxmlformats.org/presentationml/2006/main" type="title" preserve="1">
   <p:cSld name="Title Slide">
@@ -243,7 +879,7 @@
           <a:p>
             <a:fld id="{61BD92DC-2C6D-F941-B605-F643F5D6E74D}" type="datetimeFigureOut">
               <a:rPr lang="en-US" smtClean="0"/>
-              <a:t>4/20/16</a:t>
+              <a:t>4/22/16</a:t>
             </a:fld>
             <a:endParaRPr lang="en-US"/>
           </a:p>
@@ -413,7 +1049,7 @@
           <a:p>
             <a:fld id="{61BD92DC-2C6D-F941-B605-F643F5D6E74D}" type="datetimeFigureOut">
               <a:rPr lang="en-US" smtClean="0"/>
-              <a:t>4/20/16</a:t>
+              <a:t>4/22/16</a:t>
             </a:fld>
             <a:endParaRPr lang="en-US"/>
           </a:p>
@@ -593,7 +1229,7 @@
           <a:p>
             <a:fld id="{61BD92DC-2C6D-F941-B605-F643F5D6E74D}" type="datetimeFigureOut">
               <a:rPr lang="en-US" smtClean="0"/>
-              <a:t>4/20/16</a:t>
+              <a:t>4/22/16</a:t>
             </a:fld>
             <a:endParaRPr lang="en-US"/>
           </a:p>
@@ -763,7 +1399,7 @@
           <a:p>
             <a:fld id="{61BD92DC-2C6D-F941-B605-F643F5D6E74D}" type="datetimeFigureOut">
               <a:rPr lang="en-US" smtClean="0"/>
-              <a:t>4/20/16</a:t>
+              <a:t>4/22/16</a:t>
             </a:fld>
             <a:endParaRPr lang="en-US"/>
           </a:p>
@@ -1009,7 +1645,7 @@
           <a:p>
             <a:fld id="{61BD92DC-2C6D-F941-B605-F643F5D6E74D}" type="datetimeFigureOut">
               <a:rPr lang="en-US" smtClean="0"/>
-              <a:t>4/20/16</a:t>
+              <a:t>4/22/16</a:t>
             </a:fld>
             <a:endParaRPr lang="en-US"/>
           </a:p>
@@ -1241,7 +1877,7 @@
           <a:p>
             <a:fld id="{61BD92DC-2C6D-F941-B605-F643F5D6E74D}" type="datetimeFigureOut">
               <a:rPr lang="en-US" smtClean="0"/>
-              <a:t>4/20/16</a:t>
+              <a:t>4/22/16</a:t>
             </a:fld>
             <a:endParaRPr lang="en-US"/>
           </a:p>
@@ -1608,7 +2244,7 @@
           <a:p>
             <a:fld id="{61BD92DC-2C6D-F941-B605-F643F5D6E74D}" type="datetimeFigureOut">
               <a:rPr lang="en-US" smtClean="0"/>
-              <a:t>4/20/16</a:t>
+              <a:t>4/22/16</a:t>
             </a:fld>
             <a:endParaRPr lang="en-US"/>
           </a:p>
@@ -1726,7 +2362,7 @@
           <a:p>
             <a:fld id="{61BD92DC-2C6D-F941-B605-F643F5D6E74D}" type="datetimeFigureOut">
               <a:rPr lang="en-US" smtClean="0"/>
-              <a:t>4/20/16</a:t>
+              <a:t>4/22/16</a:t>
             </a:fld>
             <a:endParaRPr lang="en-US"/>
           </a:p>
@@ -1821,7 +2457,7 @@
           <a:p>
             <a:fld id="{61BD92DC-2C6D-F941-B605-F643F5D6E74D}" type="datetimeFigureOut">
               <a:rPr lang="en-US" smtClean="0"/>
-              <a:t>4/20/16</a:t>
+              <a:t>4/22/16</a:t>
             </a:fld>
             <a:endParaRPr lang="en-US"/>
           </a:p>
@@ -2098,7 +2734,7 @@
           <a:p>
             <a:fld id="{61BD92DC-2C6D-F941-B605-F643F5D6E74D}" type="datetimeFigureOut">
               <a:rPr lang="en-US" smtClean="0"/>
-              <a:t>4/20/16</a:t>
+              <a:t>4/22/16</a:t>
             </a:fld>
             <a:endParaRPr lang="en-US"/>
           </a:p>
@@ -2351,7 +2987,7 @@
           <a:p>
             <a:fld id="{61BD92DC-2C6D-F941-B605-F643F5D6E74D}" type="datetimeFigureOut">
               <a:rPr lang="en-US" smtClean="0"/>
-              <a:t>4/20/16</a:t>
+              <a:t>4/22/16</a:t>
             </a:fld>
             <a:endParaRPr lang="en-US"/>
           </a:p>
@@ -2564,7 +3200,7 @@
           <a:p>
             <a:fld id="{61BD92DC-2C6D-F941-B605-F643F5D6E74D}" type="datetimeFigureOut">
               <a:rPr lang="en-US" smtClean="0"/>
-              <a:t>4/20/16</a:t>
+              <a:t>4/22/16</a:t>
             </a:fld>
             <a:endParaRPr lang="en-US"/>
           </a:p>
@@ -3472,15 +4108,7 @@
                 <a:ea typeface="Helvetica Neue Thin" charset="0"/>
                 <a:cs typeface="Helvetica Neue Thin" charset="0"/>
               </a:rPr>
-              <a:t>Audio </a:t>
-            </a:r>
-            <a:r>
-              <a:rPr lang="en-US" dirty="0" smtClean="0">
-                <a:latin typeface="Helvetica Neue Thin" charset="0"/>
-                <a:ea typeface="Helvetica Neue Thin" charset="0"/>
-                <a:cs typeface="Helvetica Neue Thin" charset="0"/>
-              </a:rPr>
-              <a:t>Detection</a:t>
+              <a:t>Audio Detection</a:t>
             </a:r>
           </a:p>
         </p:txBody>
@@ -3603,11 +4231,6 @@
               </a:rPr>
               <a:t>(cache)</a:t>
             </a:r>
-            <a:endParaRPr lang="en-US" dirty="0" smtClean="0">
-              <a:latin typeface="Helvetica Neue Thin" charset="0"/>
-              <a:ea typeface="Helvetica Neue Thin" charset="0"/>
-              <a:cs typeface="Helvetica Neue Thin" charset="0"/>
-            </a:endParaRPr>
           </a:p>
         </p:txBody>
       </p:sp>
@@ -4092,11 +4715,6 @@
               </a:rPr>
               <a:t>(lite)</a:t>
             </a:r>
-            <a:endParaRPr lang="en-US" dirty="0" smtClean="0">
-              <a:latin typeface="Helvetica Neue Thin" charset="0"/>
-              <a:ea typeface="Helvetica Neue Thin" charset="0"/>
-              <a:cs typeface="Helvetica Neue Thin" charset="0"/>
-            </a:endParaRPr>
           </a:p>
         </p:txBody>
       </p:sp>
@@ -4307,15 +4925,7 @@
                 <a:ea typeface="Helvetica Neue Thin" charset="0"/>
                 <a:cs typeface="Helvetica Neue Thin" charset="0"/>
               </a:rPr>
-              <a:t>Anomaly </a:t>
-            </a:r>
-            <a:r>
-              <a:rPr lang="en-US" smtClean="0">
-                <a:latin typeface="Helvetica Neue Thin" charset="0"/>
-                <a:ea typeface="Helvetica Neue Thin" charset="0"/>
-                <a:cs typeface="Helvetica Neue Thin" charset="0"/>
-              </a:rPr>
-              <a:t>Discovery</a:t>
+              <a:t>Anomaly Discovery</a:t>
             </a:r>
             <a:endParaRPr lang="en-US" dirty="0">
               <a:latin typeface="Helvetica Neue Thin" charset="0"/>
@@ -4711,6 +5321,1903 @@
     <p:extLst>
       <p:ext uri="{BB962C8B-B14F-4D97-AF65-F5344CB8AC3E}">
         <p14:creationId xmlns:p14="http://schemas.microsoft.com/office/powerpoint/2010/main" val="1793558273"/>
+      </p:ext>
+    </p:extLst>
+  </p:cSld>
+  <p:clrMapOvr>
+    <a:masterClrMapping/>
+  </p:clrMapOvr>
+</p:sld>
+</file>
+
+<file path=ppt/slides/slide2.xml><?xml version="1.0" encoding="utf-8"?>
+<p:sld xmlns:a="http://schemas.openxmlformats.org/drawingml/2006/main" xmlns:r="http://schemas.openxmlformats.org/officeDocument/2006/relationships" xmlns:p="http://schemas.openxmlformats.org/presentationml/2006/main">
+  <p:cSld>
+    <p:spTree>
+      <p:nvGrpSpPr>
+        <p:cNvPr id="1" name=""/>
+        <p:cNvGrpSpPr/>
+        <p:nvPr/>
+      </p:nvGrpSpPr>
+      <p:grpSpPr>
+        <a:xfrm>
+          <a:off x="0" y="0"/>
+          <a:ext cx="0" cy="0"/>
+          <a:chOff x="0" y="0"/>
+          <a:chExt cx="0" cy="0"/>
+        </a:xfrm>
+      </p:grpSpPr>
+      <p:sp>
+        <p:nvSpPr>
+          <p:cNvPr id="86" name="Rounded Rectangle 85"/>
+          <p:cNvSpPr/>
+          <p:nvPr/>
+        </p:nvSpPr>
+        <p:spPr>
+          <a:xfrm>
+            <a:off x="7215806" y="1411356"/>
+            <a:ext cx="1987826" cy="5208105"/>
+          </a:xfrm>
+          <a:prstGeom prst="roundRect">
+            <a:avLst/>
+          </a:prstGeom>
+          <a:solidFill>
+            <a:schemeClr val="accent1">
+              <a:alpha val="30000"/>
+            </a:schemeClr>
+          </a:solidFill>
+        </p:spPr>
+        <p:style>
+          <a:lnRef idx="2">
+            <a:schemeClr val="accent1">
+              <a:shade val="50000"/>
+            </a:schemeClr>
+          </a:lnRef>
+          <a:fillRef idx="1">
+            <a:schemeClr val="accent1"/>
+          </a:fillRef>
+          <a:effectRef idx="0">
+            <a:schemeClr val="accent1"/>
+          </a:effectRef>
+          <a:fontRef idx="minor">
+            <a:schemeClr val="lt1"/>
+          </a:fontRef>
+        </p:style>
+        <p:txBody>
+          <a:bodyPr rtlCol="0" anchor="t"/>
+          <a:lstStyle/>
+          <a:p>
+            <a:r>
+              <a:rPr lang="en-US" dirty="0" smtClean="0">
+                <a:latin typeface="Helvetica Neue Light" charset="0"/>
+                <a:ea typeface="Helvetica Neue Light" charset="0"/>
+                <a:cs typeface="Helvetica Neue Light" charset="0"/>
+              </a:rPr>
+              <a:t>WATSON</a:t>
+            </a:r>
+            <a:endParaRPr lang="en-US" dirty="0">
+              <a:latin typeface="Helvetica Neue Light" charset="0"/>
+              <a:ea typeface="Helvetica Neue Light" charset="0"/>
+              <a:cs typeface="Helvetica Neue Light" charset="0"/>
+            </a:endParaRPr>
+          </a:p>
+        </p:txBody>
+      </p:sp>
+      <p:sp>
+        <p:nvSpPr>
+          <p:cNvPr id="88" name="Rounded Rectangle 87"/>
+          <p:cNvSpPr/>
+          <p:nvPr/>
+        </p:nvSpPr>
+        <p:spPr>
+          <a:xfrm>
+            <a:off x="556588" y="1411356"/>
+            <a:ext cx="6500192" cy="5208105"/>
+          </a:xfrm>
+          <a:prstGeom prst="roundRect">
+            <a:avLst/>
+          </a:prstGeom>
+          <a:solidFill>
+            <a:schemeClr val="accent1">
+              <a:alpha val="30000"/>
+            </a:schemeClr>
+          </a:solidFill>
+        </p:spPr>
+        <p:style>
+          <a:lnRef idx="2">
+            <a:schemeClr val="accent1">
+              <a:shade val="50000"/>
+            </a:schemeClr>
+          </a:lnRef>
+          <a:fillRef idx="1">
+            <a:schemeClr val="accent1"/>
+          </a:fillRef>
+          <a:effectRef idx="0">
+            <a:schemeClr val="accent1"/>
+          </a:effectRef>
+          <a:fontRef idx="minor">
+            <a:schemeClr val="lt1"/>
+          </a:fontRef>
+        </p:style>
+        <p:txBody>
+          <a:bodyPr rtlCol="0" anchor="t"/>
+          <a:lstStyle/>
+          <a:p>
+            <a:r>
+              <a:rPr lang="en-US" dirty="0" smtClean="0">
+                <a:latin typeface="Helvetica Neue Light" charset="0"/>
+                <a:ea typeface="Helvetica Neue Light" charset="0"/>
+                <a:cs typeface="Helvetica Neue Light" charset="0"/>
+              </a:rPr>
+              <a:t>DEVICE</a:t>
+            </a:r>
+            <a:endParaRPr lang="en-US" dirty="0">
+              <a:latin typeface="Helvetica Neue Light" charset="0"/>
+              <a:ea typeface="Helvetica Neue Light" charset="0"/>
+              <a:cs typeface="Helvetica Neue Light" charset="0"/>
+            </a:endParaRPr>
+          </a:p>
+        </p:txBody>
+      </p:sp>
+      <p:sp>
+        <p:nvSpPr>
+          <p:cNvPr id="6" name="Rectangle 5"/>
+          <p:cNvSpPr/>
+          <p:nvPr/>
+        </p:nvSpPr>
+        <p:spPr>
+          <a:xfrm>
+            <a:off x="802318" y="2484758"/>
+            <a:ext cx="666220" cy="1346462"/>
+          </a:xfrm>
+          <a:prstGeom prst="rect">
+            <a:avLst/>
+          </a:prstGeom>
+        </p:spPr>
+        <p:style>
+          <a:lnRef idx="1">
+            <a:schemeClr val="accent3"/>
+          </a:lnRef>
+          <a:fillRef idx="2">
+            <a:schemeClr val="accent3"/>
+          </a:fillRef>
+          <a:effectRef idx="1">
+            <a:schemeClr val="accent3"/>
+          </a:effectRef>
+          <a:fontRef idx="minor">
+            <a:schemeClr val="dk1"/>
+          </a:fontRef>
+        </p:style>
+        <p:txBody>
+          <a:bodyPr vert="vert" rtlCol="0" anchor="ctr"/>
+          <a:lstStyle/>
+          <a:p>
+            <a:pPr algn="ctr"/>
+            <a:r>
+              <a:rPr lang="en-US" dirty="0" smtClean="0">
+                <a:latin typeface="Helvetica Neue Light" charset="0"/>
+                <a:ea typeface="Helvetica Neue Light" charset="0"/>
+                <a:cs typeface="Helvetica Neue Light" charset="0"/>
+              </a:rPr>
+              <a:t>Camera</a:t>
+            </a:r>
+          </a:p>
+        </p:txBody>
+      </p:sp>
+      <p:sp>
+        <p:nvSpPr>
+          <p:cNvPr id="7" name="Rectangle 6"/>
+          <p:cNvSpPr/>
+          <p:nvPr/>
+        </p:nvSpPr>
+        <p:spPr>
+          <a:xfrm>
+            <a:off x="3069532" y="1878758"/>
+            <a:ext cx="1391478" cy="1033670"/>
+          </a:xfrm>
+          <a:prstGeom prst="rect">
+            <a:avLst/>
+          </a:prstGeom>
+        </p:spPr>
+        <p:style>
+          <a:lnRef idx="1">
+            <a:schemeClr val="accent2"/>
+          </a:lnRef>
+          <a:fillRef idx="2">
+            <a:schemeClr val="accent2"/>
+          </a:fillRef>
+          <a:effectRef idx="1">
+            <a:schemeClr val="accent2"/>
+          </a:effectRef>
+          <a:fontRef idx="minor">
+            <a:schemeClr val="dk1"/>
+          </a:fontRef>
+        </p:style>
+        <p:txBody>
+          <a:bodyPr rtlCol="0" anchor="ctr"/>
+          <a:lstStyle/>
+          <a:p>
+            <a:pPr algn="ctr"/>
+            <a:r>
+              <a:rPr lang="en-US" sz="1400" dirty="0" smtClean="0">
+                <a:latin typeface="Helvetica Neue Light" charset="0"/>
+                <a:ea typeface="Helvetica Neue Light" charset="0"/>
+                <a:cs typeface="Helvetica Neue Light" charset="0"/>
+              </a:rPr>
+              <a:t>Image Capture</a:t>
+            </a:r>
+            <a:endParaRPr lang="en-US" sz="1400" dirty="0">
+              <a:latin typeface="Helvetica Neue Light" charset="0"/>
+              <a:ea typeface="Helvetica Neue Light" charset="0"/>
+              <a:cs typeface="Helvetica Neue Light" charset="0"/>
+            </a:endParaRPr>
+          </a:p>
+        </p:txBody>
+      </p:sp>
+      <p:sp>
+        <p:nvSpPr>
+          <p:cNvPr id="10" name="Rectangle 9"/>
+          <p:cNvSpPr/>
+          <p:nvPr/>
+        </p:nvSpPr>
+        <p:spPr>
+          <a:xfrm>
+            <a:off x="3069532" y="5259411"/>
+            <a:ext cx="1391478" cy="1033670"/>
+          </a:xfrm>
+          <a:prstGeom prst="rect">
+            <a:avLst/>
+          </a:prstGeom>
+          <a:ln>
+            <a:solidFill>
+              <a:schemeClr val="accent4">
+                <a:lumMod val="40000"/>
+                <a:lumOff val="60000"/>
+              </a:schemeClr>
+            </a:solidFill>
+          </a:ln>
+        </p:spPr>
+        <p:style>
+          <a:lnRef idx="1">
+            <a:schemeClr val="accent4"/>
+          </a:lnRef>
+          <a:fillRef idx="2">
+            <a:schemeClr val="accent4"/>
+          </a:fillRef>
+          <a:effectRef idx="1">
+            <a:schemeClr val="accent4"/>
+          </a:effectRef>
+          <a:fontRef idx="minor">
+            <a:schemeClr val="dk1"/>
+          </a:fontRef>
+        </p:style>
+        <p:txBody>
+          <a:bodyPr rtlCol="0" anchor="ctr"/>
+          <a:lstStyle/>
+          <a:p>
+            <a:pPr algn="ctr"/>
+            <a:r>
+              <a:rPr lang="en-US" sz="1400" dirty="0" smtClean="0">
+                <a:latin typeface="Helvetica Neue Light" charset="0"/>
+                <a:ea typeface="Helvetica Neue Light" charset="0"/>
+                <a:cs typeface="Helvetica Neue Light" charset="0"/>
+              </a:rPr>
+              <a:t>Audio Capture</a:t>
+            </a:r>
+            <a:endParaRPr lang="en-US" sz="1400" dirty="0">
+              <a:latin typeface="Helvetica Neue Light" charset="0"/>
+              <a:ea typeface="Helvetica Neue Light" charset="0"/>
+              <a:cs typeface="Helvetica Neue Light" charset="0"/>
+            </a:endParaRPr>
+          </a:p>
+        </p:txBody>
+      </p:sp>
+      <p:sp>
+        <p:nvSpPr>
+          <p:cNvPr id="11" name="Rectangle 10"/>
+          <p:cNvSpPr/>
+          <p:nvPr/>
+        </p:nvSpPr>
+        <p:spPr>
+          <a:xfrm>
+            <a:off x="5366264" y="3573819"/>
+            <a:ext cx="1391478" cy="1033670"/>
+          </a:xfrm>
+          <a:prstGeom prst="rect">
+            <a:avLst/>
+          </a:prstGeom>
+          <a:ln/>
+        </p:spPr>
+        <p:style>
+          <a:lnRef idx="1">
+            <a:schemeClr val="accent1"/>
+          </a:lnRef>
+          <a:fillRef idx="2">
+            <a:schemeClr val="accent1"/>
+          </a:fillRef>
+          <a:effectRef idx="1">
+            <a:schemeClr val="accent1"/>
+          </a:effectRef>
+          <a:fontRef idx="minor">
+            <a:schemeClr val="dk1"/>
+          </a:fontRef>
+        </p:style>
+        <p:txBody>
+          <a:bodyPr rtlCol="0" anchor="ctr"/>
+          <a:lstStyle/>
+          <a:p>
+            <a:pPr algn="ctr"/>
+            <a:r>
+              <a:rPr lang="en-US" smtClean="0">
+                <a:solidFill>
+                  <a:schemeClr val="tx1"/>
+                </a:solidFill>
+                <a:latin typeface="Helvetica Neue Light" charset="0"/>
+                <a:ea typeface="Helvetica Neue Light" charset="0"/>
+                <a:cs typeface="Helvetica Neue Light" charset="0"/>
+              </a:rPr>
+              <a:t>Anomaly Detection</a:t>
+            </a:r>
+            <a:endParaRPr lang="en-US" dirty="0">
+              <a:solidFill>
+                <a:schemeClr val="tx1"/>
+              </a:solidFill>
+              <a:latin typeface="Helvetica Neue Light" charset="0"/>
+              <a:ea typeface="Helvetica Neue Light" charset="0"/>
+              <a:cs typeface="Helvetica Neue Light" charset="0"/>
+            </a:endParaRPr>
+          </a:p>
+        </p:txBody>
+      </p:sp>
+      <p:sp>
+        <p:nvSpPr>
+          <p:cNvPr id="12" name="Rectangle 11"/>
+          <p:cNvSpPr/>
+          <p:nvPr/>
+        </p:nvSpPr>
+        <p:spPr>
+          <a:xfrm>
+            <a:off x="3069532" y="3573821"/>
+            <a:ext cx="1391478" cy="1033670"/>
+          </a:xfrm>
+          <a:prstGeom prst="rect">
+            <a:avLst/>
+          </a:prstGeom>
+          <a:ln/>
+        </p:spPr>
+        <p:style>
+          <a:lnRef idx="1">
+            <a:schemeClr val="accent6"/>
+          </a:lnRef>
+          <a:fillRef idx="2">
+            <a:schemeClr val="accent6"/>
+          </a:fillRef>
+          <a:effectRef idx="1">
+            <a:schemeClr val="accent6"/>
+          </a:effectRef>
+          <a:fontRef idx="minor">
+            <a:schemeClr val="dk1"/>
+          </a:fontRef>
+        </p:style>
+        <p:txBody>
+          <a:bodyPr rtlCol="0" anchor="ctr"/>
+          <a:lstStyle/>
+          <a:p>
+            <a:pPr algn="ctr"/>
+            <a:r>
+              <a:rPr lang="en-US" dirty="0" smtClean="0">
+                <a:solidFill>
+                  <a:schemeClr val="tx1"/>
+                </a:solidFill>
+                <a:latin typeface="Helvetica Neue Light" charset="0"/>
+                <a:ea typeface="Helvetica Neue Light" charset="0"/>
+                <a:cs typeface="Helvetica Neue Light" charset="0"/>
+              </a:rPr>
+              <a:t>Activity</a:t>
+            </a:r>
+          </a:p>
+          <a:p>
+            <a:pPr algn="ctr"/>
+            <a:r>
+              <a:rPr lang="en-US" dirty="0" smtClean="0">
+                <a:solidFill>
+                  <a:schemeClr val="tx1"/>
+                </a:solidFill>
+                <a:latin typeface="Helvetica Neue Light" charset="0"/>
+                <a:ea typeface="Helvetica Neue Light" charset="0"/>
+                <a:cs typeface="Helvetica Neue Light" charset="0"/>
+              </a:rPr>
+              <a:t>History &amp; State</a:t>
+            </a:r>
+          </a:p>
+        </p:txBody>
+      </p:sp>
+      <p:cxnSp>
+        <p:nvCxnSpPr>
+          <p:cNvPr id="14" name="Elbow Connector 13"/>
+          <p:cNvCxnSpPr>
+            <a:stCxn id="7" idx="3"/>
+            <a:endCxn id="8" idx="1"/>
+          </p:cNvCxnSpPr>
+          <p:nvPr/>
+        </p:nvCxnSpPr>
+        <p:spPr>
+          <a:xfrm>
+            <a:off x="4461010" y="2395593"/>
+            <a:ext cx="3059596" cy="288237"/>
+          </a:xfrm>
+          <a:prstGeom prst="bentConnector3">
+            <a:avLst>
+              <a:gd name="adj1" fmla="val 50000"/>
+            </a:avLst>
+          </a:prstGeom>
+          <a:ln w="38100">
+            <a:solidFill>
+              <a:schemeClr val="accent2">
+                <a:lumMod val="40000"/>
+                <a:lumOff val="60000"/>
+              </a:schemeClr>
+            </a:solidFill>
+            <a:tailEnd type="triangle"/>
+          </a:ln>
+        </p:spPr>
+        <p:style>
+          <a:lnRef idx="1">
+            <a:schemeClr val="accent1"/>
+          </a:lnRef>
+          <a:fillRef idx="0">
+            <a:schemeClr val="accent1"/>
+          </a:fillRef>
+          <a:effectRef idx="0">
+            <a:schemeClr val="accent1"/>
+          </a:effectRef>
+          <a:fontRef idx="minor">
+            <a:schemeClr val="tx1"/>
+          </a:fontRef>
+        </p:style>
+      </p:cxnSp>
+      <p:cxnSp>
+        <p:nvCxnSpPr>
+          <p:cNvPr id="16" name="Elbow Connector 15"/>
+          <p:cNvCxnSpPr>
+            <a:stCxn id="10" idx="3"/>
+            <a:endCxn id="9" idx="1"/>
+          </p:cNvCxnSpPr>
+          <p:nvPr/>
+        </p:nvCxnSpPr>
+        <p:spPr>
+          <a:xfrm flipV="1">
+            <a:off x="4461010" y="5518711"/>
+            <a:ext cx="3059596" cy="257535"/>
+          </a:xfrm>
+          <a:prstGeom prst="bentConnector3">
+            <a:avLst>
+              <a:gd name="adj1" fmla="val 50000"/>
+            </a:avLst>
+          </a:prstGeom>
+          <a:ln w="38100">
+            <a:solidFill>
+              <a:schemeClr val="accent4">
+                <a:lumMod val="40000"/>
+                <a:lumOff val="60000"/>
+              </a:schemeClr>
+            </a:solidFill>
+            <a:tailEnd type="triangle"/>
+          </a:ln>
+        </p:spPr>
+        <p:style>
+          <a:lnRef idx="1">
+            <a:schemeClr val="accent1"/>
+          </a:lnRef>
+          <a:fillRef idx="0">
+            <a:schemeClr val="accent1"/>
+          </a:fillRef>
+          <a:effectRef idx="0">
+            <a:schemeClr val="accent1"/>
+          </a:effectRef>
+          <a:fontRef idx="minor">
+            <a:schemeClr val="tx1"/>
+          </a:fontRef>
+        </p:style>
+      </p:cxnSp>
+      <p:cxnSp>
+        <p:nvCxnSpPr>
+          <p:cNvPr id="20" name="Elbow Connector 19"/>
+          <p:cNvCxnSpPr>
+            <a:stCxn id="8" idx="2"/>
+            <a:endCxn id="12" idx="0"/>
+          </p:cNvCxnSpPr>
+          <p:nvPr/>
+        </p:nvCxnSpPr>
+        <p:spPr>
+          <a:xfrm rot="5400000">
+            <a:off x="5804230" y="1161706"/>
+            <a:ext cx="373156" cy="4451074"/>
+          </a:xfrm>
+          <a:prstGeom prst="bentConnector3">
+            <a:avLst>
+              <a:gd name="adj1" fmla="val 56973"/>
+            </a:avLst>
+          </a:prstGeom>
+          <a:ln w="38100">
+            <a:solidFill>
+              <a:schemeClr val="accent2">
+                <a:lumMod val="40000"/>
+                <a:lumOff val="60000"/>
+              </a:schemeClr>
+            </a:solidFill>
+            <a:tailEnd type="triangle"/>
+          </a:ln>
+        </p:spPr>
+        <p:style>
+          <a:lnRef idx="1">
+            <a:schemeClr val="accent1"/>
+          </a:lnRef>
+          <a:fillRef idx="0">
+            <a:schemeClr val="accent1"/>
+          </a:fillRef>
+          <a:effectRef idx="0">
+            <a:schemeClr val="accent1"/>
+          </a:effectRef>
+          <a:fontRef idx="minor">
+            <a:schemeClr val="tx1"/>
+          </a:fontRef>
+        </p:style>
+      </p:cxnSp>
+      <p:cxnSp>
+        <p:nvCxnSpPr>
+          <p:cNvPr id="26" name="Elbow Connector 25"/>
+          <p:cNvCxnSpPr>
+            <a:stCxn id="9" idx="0"/>
+            <a:endCxn id="12" idx="2"/>
+          </p:cNvCxnSpPr>
+          <p:nvPr/>
+        </p:nvCxnSpPr>
+        <p:spPr>
+          <a:xfrm rot="16200000" flipV="1">
+            <a:off x="5793616" y="2579147"/>
+            <a:ext cx="394385" cy="4451074"/>
+          </a:xfrm>
+          <a:prstGeom prst="bentConnector3">
+            <a:avLst>
+              <a:gd name="adj1" fmla="val 54684"/>
+            </a:avLst>
+          </a:prstGeom>
+          <a:ln w="38100">
+            <a:solidFill>
+              <a:schemeClr val="accent4">
+                <a:lumMod val="40000"/>
+                <a:lumOff val="60000"/>
+              </a:schemeClr>
+            </a:solidFill>
+            <a:tailEnd type="triangle"/>
+          </a:ln>
+        </p:spPr>
+        <p:style>
+          <a:lnRef idx="1">
+            <a:schemeClr val="accent1"/>
+          </a:lnRef>
+          <a:fillRef idx="0">
+            <a:schemeClr val="accent1"/>
+          </a:fillRef>
+          <a:effectRef idx="0">
+            <a:schemeClr val="accent1"/>
+          </a:effectRef>
+          <a:fontRef idx="minor">
+            <a:schemeClr val="tx1"/>
+          </a:fontRef>
+        </p:style>
+      </p:cxnSp>
+      <p:cxnSp>
+        <p:nvCxnSpPr>
+          <p:cNvPr id="33" name="Elbow Connector 32"/>
+          <p:cNvCxnSpPr>
+            <a:stCxn id="12" idx="3"/>
+            <a:endCxn id="11" idx="1"/>
+          </p:cNvCxnSpPr>
+          <p:nvPr/>
+        </p:nvCxnSpPr>
+        <p:spPr>
+          <a:xfrm flipV="1">
+            <a:off x="4461010" y="4090654"/>
+            <a:ext cx="905254" cy="2"/>
+          </a:xfrm>
+          <a:prstGeom prst="bentConnector3">
+            <a:avLst>
+              <a:gd name="adj1" fmla="val 50000"/>
+            </a:avLst>
+          </a:prstGeom>
+          <a:ln w="38100">
+            <a:solidFill>
+              <a:schemeClr val="accent6"/>
+            </a:solidFill>
+            <a:tailEnd type="triangle"/>
+          </a:ln>
+        </p:spPr>
+        <p:style>
+          <a:lnRef idx="1">
+            <a:schemeClr val="accent1"/>
+          </a:lnRef>
+          <a:fillRef idx="0">
+            <a:schemeClr val="accent1"/>
+          </a:fillRef>
+          <a:effectRef idx="0">
+            <a:schemeClr val="accent1"/>
+          </a:effectRef>
+          <a:fontRef idx="minor">
+            <a:schemeClr val="tx1"/>
+          </a:fontRef>
+        </p:style>
+      </p:cxnSp>
+      <p:sp>
+        <p:nvSpPr>
+          <p:cNvPr id="36" name="Rectangle 35"/>
+          <p:cNvSpPr/>
+          <p:nvPr/>
+        </p:nvSpPr>
+        <p:spPr>
+          <a:xfrm>
+            <a:off x="802318" y="4354711"/>
+            <a:ext cx="666220" cy="1346462"/>
+          </a:xfrm>
+          <a:prstGeom prst="rect">
+            <a:avLst/>
+          </a:prstGeom>
+        </p:spPr>
+        <p:style>
+          <a:lnRef idx="1">
+            <a:schemeClr val="accent3"/>
+          </a:lnRef>
+          <a:fillRef idx="2">
+            <a:schemeClr val="accent3"/>
+          </a:fillRef>
+          <a:effectRef idx="1">
+            <a:schemeClr val="accent3"/>
+          </a:effectRef>
+          <a:fontRef idx="minor">
+            <a:schemeClr val="dk1"/>
+          </a:fontRef>
+        </p:style>
+        <p:txBody>
+          <a:bodyPr vert="vert" rtlCol="0" anchor="ctr"/>
+          <a:lstStyle/>
+          <a:p>
+            <a:pPr algn="ctr"/>
+            <a:r>
+              <a:rPr lang="en-US" smtClean="0">
+                <a:latin typeface="Helvetica Neue Light" charset="0"/>
+                <a:ea typeface="Helvetica Neue Light" charset="0"/>
+                <a:cs typeface="Helvetica Neue Light" charset="0"/>
+              </a:rPr>
+              <a:t>Microphone</a:t>
+            </a:r>
+            <a:endParaRPr lang="en-US" dirty="0" smtClean="0">
+              <a:latin typeface="Helvetica Neue Light" charset="0"/>
+              <a:ea typeface="Helvetica Neue Light" charset="0"/>
+              <a:cs typeface="Helvetica Neue Light" charset="0"/>
+            </a:endParaRPr>
+          </a:p>
+        </p:txBody>
+      </p:sp>
+      <p:cxnSp>
+        <p:nvCxnSpPr>
+          <p:cNvPr id="37" name="Elbow Connector 36"/>
+          <p:cNvCxnSpPr>
+            <a:stCxn id="6" idx="3"/>
+            <a:endCxn id="107" idx="1"/>
+          </p:cNvCxnSpPr>
+          <p:nvPr/>
+        </p:nvCxnSpPr>
+        <p:spPr>
+          <a:xfrm flipV="1">
+            <a:off x="1468538" y="3155068"/>
+            <a:ext cx="280745" cy="2921"/>
+          </a:xfrm>
+          <a:prstGeom prst="bentConnector3">
+            <a:avLst>
+              <a:gd name="adj1" fmla="val 50000"/>
+            </a:avLst>
+          </a:prstGeom>
+          <a:ln w="38100">
+            <a:tailEnd type="triangle"/>
+          </a:ln>
+        </p:spPr>
+        <p:style>
+          <a:lnRef idx="1">
+            <a:schemeClr val="accent3"/>
+          </a:lnRef>
+          <a:fillRef idx="2">
+            <a:schemeClr val="accent3"/>
+          </a:fillRef>
+          <a:effectRef idx="1">
+            <a:schemeClr val="accent3"/>
+          </a:effectRef>
+          <a:fontRef idx="minor">
+            <a:schemeClr val="dk1"/>
+          </a:fontRef>
+        </p:style>
+      </p:cxnSp>
+      <p:cxnSp>
+        <p:nvCxnSpPr>
+          <p:cNvPr id="51" name="Elbow Connector 50"/>
+          <p:cNvCxnSpPr>
+            <a:stCxn id="36" idx="3"/>
+            <a:endCxn id="93" idx="1"/>
+          </p:cNvCxnSpPr>
+          <p:nvPr/>
+        </p:nvCxnSpPr>
+        <p:spPr>
+          <a:xfrm>
+            <a:off x="1468538" y="5027942"/>
+            <a:ext cx="220398" cy="111"/>
+          </a:xfrm>
+          <a:prstGeom prst="bentConnector3">
+            <a:avLst>
+              <a:gd name="adj1" fmla="val 50000"/>
+            </a:avLst>
+          </a:prstGeom>
+          <a:ln w="38100">
+            <a:tailEnd type="triangle"/>
+          </a:ln>
+        </p:spPr>
+        <p:style>
+          <a:lnRef idx="1">
+            <a:schemeClr val="accent3"/>
+          </a:lnRef>
+          <a:fillRef idx="2">
+            <a:schemeClr val="accent3"/>
+          </a:fillRef>
+          <a:effectRef idx="1">
+            <a:schemeClr val="accent3"/>
+          </a:effectRef>
+          <a:fontRef idx="minor">
+            <a:schemeClr val="dk1"/>
+          </a:fontRef>
+        </p:style>
+      </p:cxnSp>
+      <p:sp>
+        <p:nvSpPr>
+          <p:cNvPr id="57" name="Rectangle 56"/>
+          <p:cNvSpPr/>
+          <p:nvPr/>
+        </p:nvSpPr>
+        <p:spPr>
+          <a:xfrm>
+            <a:off x="10088217" y="3573821"/>
+            <a:ext cx="1590261" cy="1033670"/>
+          </a:xfrm>
+          <a:prstGeom prst="rect">
+            <a:avLst/>
+          </a:prstGeom>
+        </p:spPr>
+        <p:style>
+          <a:lnRef idx="2">
+            <a:schemeClr val="accent1">
+              <a:shade val="50000"/>
+            </a:schemeClr>
+          </a:lnRef>
+          <a:fillRef idx="1">
+            <a:schemeClr val="accent1"/>
+          </a:fillRef>
+          <a:effectRef idx="0">
+            <a:schemeClr val="accent1"/>
+          </a:effectRef>
+          <a:fontRef idx="minor">
+            <a:schemeClr val="lt1"/>
+          </a:fontRef>
+        </p:style>
+        <p:txBody>
+          <a:bodyPr rtlCol="0" anchor="ctr"/>
+          <a:lstStyle/>
+          <a:p>
+            <a:pPr algn="ctr"/>
+            <a:r>
+              <a:rPr lang="en-US" dirty="0" smtClean="0">
+                <a:latin typeface="Helvetica Neue Light" charset="0"/>
+                <a:ea typeface="Helvetica Neue Light" charset="0"/>
+                <a:cs typeface="Helvetica Neue Light" charset="0"/>
+              </a:rPr>
+              <a:t>Anomaly</a:t>
+            </a:r>
+          </a:p>
+          <a:p>
+            <a:pPr algn="ctr"/>
+            <a:r>
+              <a:rPr lang="en-US" dirty="0" smtClean="0">
+                <a:latin typeface="Helvetica Neue Light" charset="0"/>
+                <a:ea typeface="Helvetica Neue Light" charset="0"/>
+                <a:cs typeface="Helvetica Neue Light" charset="0"/>
+              </a:rPr>
+              <a:t>Notification</a:t>
+            </a:r>
+            <a:endParaRPr lang="en-US" dirty="0">
+              <a:latin typeface="Helvetica Neue Light" charset="0"/>
+              <a:ea typeface="Helvetica Neue Light" charset="0"/>
+              <a:cs typeface="Helvetica Neue Light" charset="0"/>
+            </a:endParaRPr>
+          </a:p>
+        </p:txBody>
+      </p:sp>
+      <p:cxnSp>
+        <p:nvCxnSpPr>
+          <p:cNvPr id="58" name="Elbow Connector 57"/>
+          <p:cNvCxnSpPr>
+            <a:stCxn id="11" idx="3"/>
+            <a:endCxn id="57" idx="1"/>
+          </p:cNvCxnSpPr>
+          <p:nvPr/>
+        </p:nvCxnSpPr>
+        <p:spPr>
+          <a:xfrm>
+            <a:off x="6757742" y="4090654"/>
+            <a:ext cx="3330475" cy="2"/>
+          </a:xfrm>
+          <a:prstGeom prst="bentConnector3">
+            <a:avLst>
+              <a:gd name="adj1" fmla="val 50000"/>
+            </a:avLst>
+          </a:prstGeom>
+          <a:ln w="38100">
+            <a:tailEnd type="triangle"/>
+          </a:ln>
+        </p:spPr>
+        <p:style>
+          <a:lnRef idx="1">
+            <a:schemeClr val="accent1"/>
+          </a:lnRef>
+          <a:fillRef idx="0">
+            <a:schemeClr val="accent1"/>
+          </a:fillRef>
+          <a:effectRef idx="0">
+            <a:schemeClr val="accent1"/>
+          </a:effectRef>
+          <a:fontRef idx="minor">
+            <a:schemeClr val="tx1"/>
+          </a:fontRef>
+        </p:style>
+      </p:cxnSp>
+      <p:sp>
+        <p:nvSpPr>
+          <p:cNvPr id="91" name="Rectangle 90"/>
+          <p:cNvSpPr/>
+          <p:nvPr/>
+        </p:nvSpPr>
+        <p:spPr>
+          <a:xfrm>
+            <a:off x="5085520" y="2083871"/>
+            <a:ext cx="1391478" cy="1033670"/>
+          </a:xfrm>
+          <a:prstGeom prst="rect">
+            <a:avLst/>
+          </a:prstGeom>
+        </p:spPr>
+        <p:style>
+          <a:lnRef idx="1">
+            <a:schemeClr val="accent2"/>
+          </a:lnRef>
+          <a:fillRef idx="2">
+            <a:schemeClr val="accent2"/>
+          </a:fillRef>
+          <a:effectRef idx="1">
+            <a:schemeClr val="accent2"/>
+          </a:effectRef>
+          <a:fontRef idx="minor">
+            <a:schemeClr val="dk1"/>
+          </a:fontRef>
+        </p:style>
+        <p:txBody>
+          <a:bodyPr rtlCol="0" anchor="ctr"/>
+          <a:lstStyle/>
+          <a:p>
+            <a:pPr algn="ctr"/>
+            <a:r>
+              <a:rPr lang="en-US" dirty="0" smtClean="0">
+                <a:latin typeface="Helvetica Neue Light" charset="0"/>
+                <a:ea typeface="Helvetica Neue Light" charset="0"/>
+                <a:cs typeface="Helvetica Neue Light" charset="0"/>
+              </a:rPr>
+              <a:t>Object Detection</a:t>
+            </a:r>
+            <a:endParaRPr lang="en-US" dirty="0">
+              <a:latin typeface="Helvetica Neue Light" charset="0"/>
+              <a:ea typeface="Helvetica Neue Light" charset="0"/>
+              <a:cs typeface="Helvetica Neue Light" charset="0"/>
+            </a:endParaRPr>
+          </a:p>
+        </p:txBody>
+      </p:sp>
+      <p:sp>
+        <p:nvSpPr>
+          <p:cNvPr id="92" name="Rectangle 91"/>
+          <p:cNvSpPr/>
+          <p:nvPr/>
+        </p:nvSpPr>
+        <p:spPr>
+          <a:xfrm>
+            <a:off x="5085520" y="5066528"/>
+            <a:ext cx="1391478" cy="1033670"/>
+          </a:xfrm>
+          <a:prstGeom prst="rect">
+            <a:avLst/>
+          </a:prstGeom>
+          <a:ln>
+            <a:solidFill>
+              <a:schemeClr val="accent4">
+                <a:lumMod val="40000"/>
+                <a:lumOff val="60000"/>
+              </a:schemeClr>
+            </a:solidFill>
+          </a:ln>
+        </p:spPr>
+        <p:style>
+          <a:lnRef idx="1">
+            <a:schemeClr val="accent4"/>
+          </a:lnRef>
+          <a:fillRef idx="2">
+            <a:schemeClr val="accent4"/>
+          </a:fillRef>
+          <a:effectRef idx="1">
+            <a:schemeClr val="accent4"/>
+          </a:effectRef>
+          <a:fontRef idx="minor">
+            <a:schemeClr val="dk1"/>
+          </a:fontRef>
+        </p:style>
+        <p:txBody>
+          <a:bodyPr rtlCol="0" anchor="ctr"/>
+          <a:lstStyle/>
+          <a:p>
+            <a:pPr algn="ctr"/>
+            <a:r>
+              <a:rPr lang="en-US" dirty="0" smtClean="0">
+                <a:latin typeface="Helvetica Neue Light" charset="0"/>
+                <a:ea typeface="Helvetica Neue Light" charset="0"/>
+                <a:cs typeface="Helvetica Neue Light" charset="0"/>
+              </a:rPr>
+              <a:t>Language/  Keyword</a:t>
+            </a:r>
+          </a:p>
+          <a:p>
+            <a:pPr algn="ctr"/>
+            <a:r>
+              <a:rPr lang="en-US" dirty="0" smtClean="0">
+                <a:latin typeface="Helvetica Neue Light" charset="0"/>
+                <a:ea typeface="Helvetica Neue Light" charset="0"/>
+                <a:cs typeface="Helvetica Neue Light" charset="0"/>
+              </a:rPr>
+              <a:t>Detection</a:t>
+            </a:r>
+            <a:endParaRPr lang="en-US" dirty="0">
+              <a:latin typeface="Helvetica Neue Light" charset="0"/>
+              <a:ea typeface="Helvetica Neue Light" charset="0"/>
+              <a:cs typeface="Helvetica Neue Light" charset="0"/>
+            </a:endParaRPr>
+          </a:p>
+        </p:txBody>
+      </p:sp>
+      <p:cxnSp>
+        <p:nvCxnSpPr>
+          <p:cNvPr id="32" name="Elbow Connector 31"/>
+          <p:cNvCxnSpPr>
+            <a:stCxn id="10" idx="3"/>
+            <a:endCxn id="12" idx="2"/>
+          </p:cNvCxnSpPr>
+          <p:nvPr/>
+        </p:nvCxnSpPr>
+        <p:spPr>
+          <a:xfrm flipH="1" flipV="1">
+            <a:off x="3765271" y="4607491"/>
+            <a:ext cx="695739" cy="1168755"/>
+          </a:xfrm>
+          <a:prstGeom prst="bentConnector4">
+            <a:avLst>
+              <a:gd name="adj1" fmla="val -32857"/>
+              <a:gd name="adj2" fmla="val 76061"/>
+            </a:avLst>
+          </a:prstGeom>
+          <a:ln w="38100">
+            <a:solidFill>
+              <a:schemeClr val="accent4">
+                <a:lumMod val="40000"/>
+                <a:lumOff val="60000"/>
+              </a:schemeClr>
+            </a:solidFill>
+            <a:tailEnd type="triangle"/>
+          </a:ln>
+        </p:spPr>
+        <p:style>
+          <a:lnRef idx="1">
+            <a:schemeClr val="accent1"/>
+          </a:lnRef>
+          <a:fillRef idx="0">
+            <a:schemeClr val="accent1"/>
+          </a:fillRef>
+          <a:effectRef idx="0">
+            <a:schemeClr val="accent1"/>
+          </a:effectRef>
+          <a:fontRef idx="minor">
+            <a:schemeClr val="tx1"/>
+          </a:fontRef>
+        </p:style>
+      </p:cxnSp>
+      <p:cxnSp>
+        <p:nvCxnSpPr>
+          <p:cNvPr id="38" name="Elbow Connector 37"/>
+          <p:cNvCxnSpPr>
+            <a:stCxn id="92" idx="3"/>
+            <a:endCxn id="12" idx="2"/>
+          </p:cNvCxnSpPr>
+          <p:nvPr/>
+        </p:nvCxnSpPr>
+        <p:spPr>
+          <a:xfrm flipH="1" flipV="1">
+            <a:off x="3765271" y="4607491"/>
+            <a:ext cx="2711727" cy="975872"/>
+          </a:xfrm>
+          <a:prstGeom prst="bentConnector4">
+            <a:avLst>
+              <a:gd name="adj1" fmla="val -8430"/>
+              <a:gd name="adj2" fmla="val 76481"/>
+            </a:avLst>
+          </a:prstGeom>
+          <a:ln w="38100">
+            <a:solidFill>
+              <a:schemeClr val="accent4">
+                <a:lumMod val="40000"/>
+                <a:lumOff val="60000"/>
+              </a:schemeClr>
+            </a:solidFill>
+            <a:tailEnd type="triangle"/>
+          </a:ln>
+        </p:spPr>
+        <p:style>
+          <a:lnRef idx="1">
+            <a:schemeClr val="accent1"/>
+          </a:lnRef>
+          <a:fillRef idx="0">
+            <a:schemeClr val="accent1"/>
+          </a:fillRef>
+          <a:effectRef idx="0">
+            <a:schemeClr val="accent1"/>
+          </a:effectRef>
+          <a:fontRef idx="minor">
+            <a:schemeClr val="tx1"/>
+          </a:fontRef>
+        </p:style>
+      </p:cxnSp>
+      <p:cxnSp>
+        <p:nvCxnSpPr>
+          <p:cNvPr id="41" name="Elbow Connector 40"/>
+          <p:cNvCxnSpPr>
+            <a:stCxn id="7" idx="3"/>
+            <a:endCxn id="12" idx="0"/>
+          </p:cNvCxnSpPr>
+          <p:nvPr/>
+        </p:nvCxnSpPr>
+        <p:spPr>
+          <a:xfrm flipH="1">
+            <a:off x="3765271" y="2395593"/>
+            <a:ext cx="695739" cy="1178228"/>
+          </a:xfrm>
+          <a:prstGeom prst="bentConnector4">
+            <a:avLst>
+              <a:gd name="adj1" fmla="val -32857"/>
+              <a:gd name="adj2" fmla="val 78988"/>
+            </a:avLst>
+          </a:prstGeom>
+          <a:ln w="38100">
+            <a:solidFill>
+              <a:schemeClr val="accent2">
+                <a:lumMod val="40000"/>
+                <a:lumOff val="60000"/>
+              </a:schemeClr>
+            </a:solidFill>
+            <a:tailEnd type="triangle"/>
+          </a:ln>
+        </p:spPr>
+        <p:style>
+          <a:lnRef idx="1">
+            <a:schemeClr val="accent1"/>
+          </a:lnRef>
+          <a:fillRef idx="0">
+            <a:schemeClr val="accent1"/>
+          </a:fillRef>
+          <a:effectRef idx="0">
+            <a:schemeClr val="accent1"/>
+          </a:effectRef>
+          <a:fontRef idx="minor">
+            <a:schemeClr val="tx1"/>
+          </a:fontRef>
+        </p:style>
+      </p:cxnSp>
+      <p:cxnSp>
+        <p:nvCxnSpPr>
+          <p:cNvPr id="44" name="Elbow Connector 43"/>
+          <p:cNvCxnSpPr>
+            <a:stCxn id="91" idx="3"/>
+            <a:endCxn id="12" idx="0"/>
+          </p:cNvCxnSpPr>
+          <p:nvPr/>
+        </p:nvCxnSpPr>
+        <p:spPr>
+          <a:xfrm flipH="1">
+            <a:off x="3765271" y="2600706"/>
+            <a:ext cx="2711727" cy="973115"/>
+          </a:xfrm>
+          <a:prstGeom prst="bentConnector4">
+            <a:avLst>
+              <a:gd name="adj1" fmla="val -8430"/>
+              <a:gd name="adj2" fmla="val 78848"/>
+            </a:avLst>
+          </a:prstGeom>
+          <a:ln w="38100">
+            <a:solidFill>
+              <a:schemeClr val="accent2">
+                <a:lumMod val="40000"/>
+                <a:lumOff val="60000"/>
+              </a:schemeClr>
+            </a:solidFill>
+            <a:tailEnd type="triangle"/>
+          </a:ln>
+        </p:spPr>
+        <p:style>
+          <a:lnRef idx="1">
+            <a:schemeClr val="accent1"/>
+          </a:lnRef>
+          <a:fillRef idx="0">
+            <a:schemeClr val="accent1"/>
+          </a:fillRef>
+          <a:effectRef idx="0">
+            <a:schemeClr val="accent1"/>
+          </a:effectRef>
+          <a:fontRef idx="minor">
+            <a:schemeClr val="tx1"/>
+          </a:fontRef>
+        </p:style>
+      </p:cxnSp>
+      <p:sp>
+        <p:nvSpPr>
+          <p:cNvPr id="9" name="Rectangle 8"/>
+          <p:cNvSpPr/>
+          <p:nvPr/>
+        </p:nvSpPr>
+        <p:spPr>
+          <a:xfrm>
+            <a:off x="7520606" y="5001876"/>
+            <a:ext cx="1391478" cy="1033670"/>
+          </a:xfrm>
+          <a:prstGeom prst="rect">
+            <a:avLst/>
+          </a:prstGeom>
+        </p:spPr>
+        <p:style>
+          <a:lnRef idx="1">
+            <a:schemeClr val="accent4"/>
+          </a:lnRef>
+          <a:fillRef idx="2">
+            <a:schemeClr val="accent4"/>
+          </a:fillRef>
+          <a:effectRef idx="1">
+            <a:schemeClr val="accent4"/>
+          </a:effectRef>
+          <a:fontRef idx="minor">
+            <a:schemeClr val="dk1"/>
+          </a:fontRef>
+        </p:style>
+        <p:txBody>
+          <a:bodyPr rtlCol="0" anchor="ctr"/>
+          <a:lstStyle/>
+          <a:p>
+            <a:pPr algn="ctr"/>
+            <a:r>
+              <a:rPr lang="en-US" dirty="0" smtClean="0">
+                <a:latin typeface="Helvetica Neue Light" charset="0"/>
+                <a:ea typeface="Helvetica Neue Light" charset="0"/>
+                <a:cs typeface="Helvetica Neue Light" charset="0"/>
+              </a:rPr>
+              <a:t>Language</a:t>
+            </a:r>
+          </a:p>
+          <a:p>
+            <a:pPr algn="ctr"/>
+            <a:r>
+              <a:rPr lang="en-US" dirty="0" smtClean="0">
+                <a:latin typeface="Helvetica Neue Light" charset="0"/>
+                <a:ea typeface="Helvetica Neue Light" charset="0"/>
+                <a:cs typeface="Helvetica Neue Light" charset="0"/>
+              </a:rPr>
+              <a:t>Analysis</a:t>
+            </a:r>
+            <a:endParaRPr lang="en-US" dirty="0">
+              <a:latin typeface="Helvetica Neue Light" charset="0"/>
+              <a:ea typeface="Helvetica Neue Light" charset="0"/>
+              <a:cs typeface="Helvetica Neue Light" charset="0"/>
+            </a:endParaRPr>
+          </a:p>
+        </p:txBody>
+      </p:sp>
+      <p:sp>
+        <p:nvSpPr>
+          <p:cNvPr id="8" name="Rectangle 7"/>
+          <p:cNvSpPr/>
+          <p:nvPr/>
+        </p:nvSpPr>
+        <p:spPr>
+          <a:xfrm>
+            <a:off x="7520606" y="2166995"/>
+            <a:ext cx="1391478" cy="1033670"/>
+          </a:xfrm>
+          <a:prstGeom prst="rect">
+            <a:avLst/>
+          </a:prstGeom>
+        </p:spPr>
+        <p:style>
+          <a:lnRef idx="1">
+            <a:schemeClr val="accent2"/>
+          </a:lnRef>
+          <a:fillRef idx="2">
+            <a:schemeClr val="accent2"/>
+          </a:fillRef>
+          <a:effectRef idx="1">
+            <a:schemeClr val="accent2"/>
+          </a:effectRef>
+          <a:fontRef idx="minor">
+            <a:schemeClr val="dk1"/>
+          </a:fontRef>
+        </p:style>
+        <p:txBody>
+          <a:bodyPr rtlCol="0" anchor="ctr"/>
+          <a:lstStyle/>
+          <a:p>
+            <a:pPr algn="ctr"/>
+            <a:r>
+              <a:rPr lang="en-US" dirty="0" smtClean="0">
+                <a:latin typeface="Helvetica Neue Light" charset="0"/>
+                <a:ea typeface="Helvetica Neue Light" charset="0"/>
+                <a:cs typeface="Helvetica Neue Light" charset="0"/>
+              </a:rPr>
+              <a:t>Image</a:t>
+            </a:r>
+          </a:p>
+          <a:p>
+            <a:pPr algn="ctr"/>
+            <a:r>
+              <a:rPr lang="en-US" dirty="0" smtClean="0">
+                <a:latin typeface="Helvetica Neue Light" charset="0"/>
+                <a:ea typeface="Helvetica Neue Light" charset="0"/>
+                <a:cs typeface="Helvetica Neue Light" charset="0"/>
+              </a:rPr>
+              <a:t>Analysis</a:t>
+            </a:r>
+            <a:endParaRPr lang="en-US" dirty="0">
+              <a:latin typeface="Helvetica Neue Light" charset="0"/>
+              <a:ea typeface="Helvetica Neue Light" charset="0"/>
+              <a:cs typeface="Helvetica Neue Light" charset="0"/>
+            </a:endParaRPr>
+          </a:p>
+        </p:txBody>
+      </p:sp>
+      <p:cxnSp>
+        <p:nvCxnSpPr>
+          <p:cNvPr id="63" name="Elbow Connector 62"/>
+          <p:cNvCxnSpPr>
+            <a:stCxn id="11" idx="2"/>
+            <a:endCxn id="10" idx="0"/>
+          </p:cNvCxnSpPr>
+          <p:nvPr/>
+        </p:nvCxnSpPr>
+        <p:spPr>
+          <a:xfrm rot="5400000">
+            <a:off x="4587676" y="3785084"/>
+            <a:ext cx="651922" cy="2296732"/>
+          </a:xfrm>
+          <a:prstGeom prst="bentConnector3">
+            <a:avLst>
+              <a:gd name="adj1" fmla="val 54250"/>
+            </a:avLst>
+          </a:prstGeom>
+          <a:ln w="38100">
+            <a:solidFill>
+              <a:schemeClr val="accent1"/>
+            </a:solidFill>
+            <a:tailEnd type="triangle"/>
+          </a:ln>
+        </p:spPr>
+        <p:style>
+          <a:lnRef idx="1">
+            <a:schemeClr val="accent1"/>
+          </a:lnRef>
+          <a:fillRef idx="0">
+            <a:schemeClr val="accent1"/>
+          </a:fillRef>
+          <a:effectRef idx="0">
+            <a:schemeClr val="accent1"/>
+          </a:effectRef>
+          <a:fontRef idx="minor">
+            <a:schemeClr val="tx1"/>
+          </a:fontRef>
+        </p:style>
+      </p:cxnSp>
+      <p:cxnSp>
+        <p:nvCxnSpPr>
+          <p:cNvPr id="74" name="Elbow Connector 73"/>
+          <p:cNvCxnSpPr>
+            <a:stCxn id="11" idx="0"/>
+            <a:endCxn id="7" idx="2"/>
+          </p:cNvCxnSpPr>
+          <p:nvPr/>
+        </p:nvCxnSpPr>
+        <p:spPr>
+          <a:xfrm rot="16200000" flipV="1">
+            <a:off x="4582942" y="2094758"/>
+            <a:ext cx="661391" cy="2296732"/>
+          </a:xfrm>
+          <a:prstGeom prst="bentConnector3">
+            <a:avLst>
+              <a:gd name="adj1" fmla="val 47207"/>
+            </a:avLst>
+          </a:prstGeom>
+          <a:ln w="38100">
+            <a:solidFill>
+              <a:schemeClr val="accent1"/>
+            </a:solidFill>
+            <a:tailEnd type="triangle"/>
+          </a:ln>
+        </p:spPr>
+        <p:style>
+          <a:lnRef idx="1">
+            <a:schemeClr val="accent1"/>
+          </a:lnRef>
+          <a:fillRef idx="0">
+            <a:schemeClr val="accent1"/>
+          </a:fillRef>
+          <a:effectRef idx="0">
+            <a:schemeClr val="accent1"/>
+          </a:effectRef>
+          <a:fontRef idx="minor">
+            <a:schemeClr val="tx1"/>
+          </a:fontRef>
+        </p:style>
+      </p:cxnSp>
+      <p:pic>
+        <p:nvPicPr>
+          <p:cNvPr id="84" name="Picture 83"/>
+          <p:cNvPicPr>
+            <a:picLocks noChangeAspect="1"/>
+          </p:cNvPicPr>
+          <p:nvPr/>
+        </p:nvPicPr>
+        <p:blipFill>
+          <a:blip r:embed="rId3"/>
+          <a:stretch>
+            <a:fillRect/>
+          </a:stretch>
+        </p:blipFill>
+        <p:spPr>
+          <a:xfrm>
+            <a:off x="7875746" y="4348991"/>
+            <a:ext cx="520700" cy="393700"/>
+          </a:xfrm>
+          <a:prstGeom prst="rect">
+            <a:avLst/>
+          </a:prstGeom>
+        </p:spPr>
+      </p:pic>
+      <p:pic>
+        <p:nvPicPr>
+          <p:cNvPr id="85" name="Picture 84"/>
+          <p:cNvPicPr>
+            <a:picLocks noChangeAspect="1"/>
+          </p:cNvPicPr>
+          <p:nvPr/>
+        </p:nvPicPr>
+        <p:blipFill>
+          <a:blip r:embed="rId4"/>
+          <a:stretch>
+            <a:fillRect/>
+          </a:stretch>
+        </p:blipFill>
+        <p:spPr>
+          <a:xfrm>
+            <a:off x="7250358" y="4261876"/>
+            <a:ext cx="660531" cy="660531"/>
+          </a:xfrm>
+          <a:prstGeom prst="rect">
+            <a:avLst/>
+          </a:prstGeom>
+        </p:spPr>
+      </p:pic>
+      <p:pic>
+        <p:nvPicPr>
+          <p:cNvPr id="87" name="Picture 86"/>
+          <p:cNvPicPr>
+            <a:picLocks noChangeAspect="1"/>
+          </p:cNvPicPr>
+          <p:nvPr/>
+        </p:nvPicPr>
+        <p:blipFill>
+          <a:blip r:embed="rId5"/>
+          <a:stretch>
+            <a:fillRect/>
+          </a:stretch>
+        </p:blipFill>
+        <p:spPr>
+          <a:xfrm>
+            <a:off x="4539104" y="5814632"/>
+            <a:ext cx="457200" cy="444500"/>
+          </a:xfrm>
+          <a:prstGeom prst="rect">
+            <a:avLst/>
+          </a:prstGeom>
+        </p:spPr>
+      </p:pic>
+      <p:pic>
+        <p:nvPicPr>
+          <p:cNvPr id="90" name="Picture 89"/>
+          <p:cNvPicPr>
+            <a:picLocks noChangeAspect="1"/>
+          </p:cNvPicPr>
+          <p:nvPr/>
+        </p:nvPicPr>
+        <p:blipFill>
+          <a:blip r:embed="rId6"/>
+          <a:stretch>
+            <a:fillRect/>
+          </a:stretch>
+        </p:blipFill>
+        <p:spPr>
+          <a:xfrm>
+            <a:off x="6527524" y="5572267"/>
+            <a:ext cx="467812" cy="546100"/>
+          </a:xfrm>
+          <a:prstGeom prst="rect">
+            <a:avLst/>
+          </a:prstGeom>
+        </p:spPr>
+      </p:pic>
+      <p:sp>
+        <p:nvSpPr>
+          <p:cNvPr id="93" name="Rectangle 92"/>
+          <p:cNvSpPr/>
+          <p:nvPr/>
+        </p:nvSpPr>
+        <p:spPr>
+          <a:xfrm>
+            <a:off x="1688936" y="4511218"/>
+            <a:ext cx="965602" cy="1033670"/>
+          </a:xfrm>
+          <a:prstGeom prst="rect">
+            <a:avLst/>
+          </a:prstGeom>
+          <a:ln>
+            <a:solidFill>
+              <a:schemeClr val="accent4">
+                <a:lumMod val="40000"/>
+                <a:lumOff val="60000"/>
+              </a:schemeClr>
+            </a:solidFill>
+          </a:ln>
+        </p:spPr>
+        <p:style>
+          <a:lnRef idx="1">
+            <a:schemeClr val="accent4"/>
+          </a:lnRef>
+          <a:fillRef idx="2">
+            <a:schemeClr val="accent4"/>
+          </a:fillRef>
+          <a:effectRef idx="1">
+            <a:schemeClr val="accent4"/>
+          </a:effectRef>
+          <a:fontRef idx="minor">
+            <a:schemeClr val="dk1"/>
+          </a:fontRef>
+        </p:style>
+        <p:txBody>
+          <a:bodyPr rtlCol="0" anchor="ctr"/>
+          <a:lstStyle/>
+          <a:p>
+            <a:pPr algn="ctr"/>
+            <a:r>
+              <a:rPr lang="en-US" sz="1200" smtClean="0">
+                <a:latin typeface="Helvetica Neue Light" charset="0"/>
+                <a:ea typeface="Helvetica Neue Light" charset="0"/>
+                <a:cs typeface="Helvetica Neue Light" charset="0"/>
+              </a:rPr>
+              <a:t>Sound Detection</a:t>
+            </a:r>
+            <a:endParaRPr lang="en-US" sz="1200" dirty="0">
+              <a:latin typeface="Helvetica Neue Light" charset="0"/>
+              <a:ea typeface="Helvetica Neue Light" charset="0"/>
+              <a:cs typeface="Helvetica Neue Light" charset="0"/>
+            </a:endParaRPr>
+          </a:p>
+        </p:txBody>
+      </p:sp>
+      <p:cxnSp>
+        <p:nvCxnSpPr>
+          <p:cNvPr id="100" name="Elbow Connector 99"/>
+          <p:cNvCxnSpPr>
+            <a:stCxn id="93" idx="3"/>
+            <a:endCxn id="10" idx="1"/>
+          </p:cNvCxnSpPr>
+          <p:nvPr/>
+        </p:nvCxnSpPr>
+        <p:spPr>
+          <a:xfrm>
+            <a:off x="2654538" y="5028053"/>
+            <a:ext cx="414994" cy="748193"/>
+          </a:xfrm>
+          <a:prstGeom prst="bentConnector3">
+            <a:avLst>
+              <a:gd name="adj1" fmla="val 50000"/>
+            </a:avLst>
+          </a:prstGeom>
+          <a:ln w="38100">
+            <a:solidFill>
+              <a:schemeClr val="accent4">
+                <a:lumMod val="40000"/>
+                <a:lumOff val="60000"/>
+              </a:schemeClr>
+            </a:solidFill>
+            <a:tailEnd type="triangle"/>
+          </a:ln>
+        </p:spPr>
+        <p:style>
+          <a:lnRef idx="1">
+            <a:schemeClr val="accent1"/>
+          </a:lnRef>
+          <a:fillRef idx="0">
+            <a:schemeClr val="accent1"/>
+          </a:fillRef>
+          <a:effectRef idx="0">
+            <a:schemeClr val="accent1"/>
+          </a:effectRef>
+          <a:fontRef idx="minor">
+            <a:schemeClr val="tx1"/>
+          </a:fontRef>
+        </p:style>
+      </p:cxnSp>
+      <p:cxnSp>
+        <p:nvCxnSpPr>
+          <p:cNvPr id="103" name="Elbow Connector 102"/>
+          <p:cNvCxnSpPr>
+            <a:stCxn id="93" idx="3"/>
+            <a:endCxn id="12" idx="1"/>
+          </p:cNvCxnSpPr>
+          <p:nvPr/>
+        </p:nvCxnSpPr>
+        <p:spPr>
+          <a:xfrm flipV="1">
+            <a:off x="2654538" y="4090656"/>
+            <a:ext cx="414994" cy="937397"/>
+          </a:xfrm>
+          <a:prstGeom prst="bentConnector3">
+            <a:avLst>
+              <a:gd name="adj1" fmla="val 50000"/>
+            </a:avLst>
+          </a:prstGeom>
+          <a:ln w="38100">
+            <a:solidFill>
+              <a:schemeClr val="accent4">
+                <a:lumMod val="40000"/>
+                <a:lumOff val="60000"/>
+              </a:schemeClr>
+            </a:solidFill>
+            <a:tailEnd type="triangle"/>
+          </a:ln>
+        </p:spPr>
+        <p:style>
+          <a:lnRef idx="1">
+            <a:schemeClr val="accent1"/>
+          </a:lnRef>
+          <a:fillRef idx="0">
+            <a:schemeClr val="accent1"/>
+          </a:fillRef>
+          <a:effectRef idx="0">
+            <a:schemeClr val="accent1"/>
+          </a:effectRef>
+          <a:fontRef idx="minor">
+            <a:schemeClr val="tx1"/>
+          </a:fontRef>
+        </p:style>
+      </p:cxnSp>
+      <p:sp>
+        <p:nvSpPr>
+          <p:cNvPr id="107" name="Rectangle 106"/>
+          <p:cNvSpPr/>
+          <p:nvPr/>
+        </p:nvSpPr>
+        <p:spPr>
+          <a:xfrm>
+            <a:off x="1749283" y="2638233"/>
+            <a:ext cx="905255" cy="1033670"/>
+          </a:xfrm>
+          <a:prstGeom prst="rect">
+            <a:avLst/>
+          </a:prstGeom>
+        </p:spPr>
+        <p:style>
+          <a:lnRef idx="1">
+            <a:schemeClr val="accent2"/>
+          </a:lnRef>
+          <a:fillRef idx="2">
+            <a:schemeClr val="accent2"/>
+          </a:fillRef>
+          <a:effectRef idx="1">
+            <a:schemeClr val="accent2"/>
+          </a:effectRef>
+          <a:fontRef idx="minor">
+            <a:schemeClr val="dk1"/>
+          </a:fontRef>
+        </p:style>
+        <p:txBody>
+          <a:bodyPr rtlCol="0" anchor="ctr"/>
+          <a:lstStyle/>
+          <a:p>
+            <a:pPr algn="ctr"/>
+            <a:r>
+              <a:rPr lang="en-US" sz="1200" dirty="0" smtClean="0">
+                <a:latin typeface="Helvetica Neue Light" charset="0"/>
+                <a:ea typeface="Helvetica Neue Light" charset="0"/>
+                <a:cs typeface="Helvetica Neue Light" charset="0"/>
+              </a:rPr>
+              <a:t>Motion</a:t>
+            </a:r>
+          </a:p>
+          <a:p>
+            <a:pPr algn="ctr"/>
+            <a:r>
+              <a:rPr lang="en-US" sz="1200" dirty="0" smtClean="0">
+                <a:latin typeface="Helvetica Neue Light" charset="0"/>
+                <a:ea typeface="Helvetica Neue Light" charset="0"/>
+                <a:cs typeface="Helvetica Neue Light" charset="0"/>
+              </a:rPr>
+              <a:t>Detection</a:t>
+            </a:r>
+            <a:endParaRPr lang="en-US" sz="1200" dirty="0">
+              <a:latin typeface="Helvetica Neue Light" charset="0"/>
+              <a:ea typeface="Helvetica Neue Light" charset="0"/>
+              <a:cs typeface="Helvetica Neue Light" charset="0"/>
+            </a:endParaRPr>
+          </a:p>
+        </p:txBody>
+      </p:sp>
+      <p:cxnSp>
+        <p:nvCxnSpPr>
+          <p:cNvPr id="110" name="Elbow Connector 109"/>
+          <p:cNvCxnSpPr>
+            <a:stCxn id="107" idx="3"/>
+            <a:endCxn id="7" idx="1"/>
+          </p:cNvCxnSpPr>
+          <p:nvPr/>
+        </p:nvCxnSpPr>
+        <p:spPr>
+          <a:xfrm flipV="1">
+            <a:off x="2654538" y="2395593"/>
+            <a:ext cx="414994" cy="759475"/>
+          </a:xfrm>
+          <a:prstGeom prst="bentConnector3">
+            <a:avLst>
+              <a:gd name="adj1" fmla="val 50000"/>
+            </a:avLst>
+          </a:prstGeom>
+          <a:ln w="38100">
+            <a:solidFill>
+              <a:schemeClr val="accent2">
+                <a:lumMod val="40000"/>
+                <a:lumOff val="60000"/>
+              </a:schemeClr>
+            </a:solidFill>
+            <a:tailEnd type="triangle"/>
+          </a:ln>
+        </p:spPr>
+        <p:style>
+          <a:lnRef idx="1">
+            <a:schemeClr val="accent1"/>
+          </a:lnRef>
+          <a:fillRef idx="0">
+            <a:schemeClr val="accent1"/>
+          </a:fillRef>
+          <a:effectRef idx="0">
+            <a:schemeClr val="accent1"/>
+          </a:effectRef>
+          <a:fontRef idx="minor">
+            <a:schemeClr val="tx1"/>
+          </a:fontRef>
+        </p:style>
+      </p:cxnSp>
+      <p:cxnSp>
+        <p:nvCxnSpPr>
+          <p:cNvPr id="117" name="Elbow Connector 116"/>
+          <p:cNvCxnSpPr>
+            <a:stCxn id="107" idx="3"/>
+            <a:endCxn id="12" idx="1"/>
+          </p:cNvCxnSpPr>
+          <p:nvPr/>
+        </p:nvCxnSpPr>
+        <p:spPr>
+          <a:xfrm>
+            <a:off x="2654538" y="3155068"/>
+            <a:ext cx="414994" cy="935588"/>
+          </a:xfrm>
+          <a:prstGeom prst="bentConnector3">
+            <a:avLst>
+              <a:gd name="adj1" fmla="val 50000"/>
+            </a:avLst>
+          </a:prstGeom>
+          <a:ln w="38100">
+            <a:solidFill>
+              <a:schemeClr val="accent2">
+                <a:lumMod val="40000"/>
+                <a:lumOff val="60000"/>
+              </a:schemeClr>
+            </a:solidFill>
+            <a:tailEnd type="triangle"/>
+          </a:ln>
+        </p:spPr>
+        <p:style>
+          <a:lnRef idx="1">
+            <a:schemeClr val="accent1"/>
+          </a:lnRef>
+          <a:fillRef idx="0">
+            <a:schemeClr val="accent1"/>
+          </a:fillRef>
+          <a:effectRef idx="0">
+            <a:schemeClr val="accent1"/>
+          </a:effectRef>
+          <a:fontRef idx="minor">
+            <a:schemeClr val="tx1"/>
+          </a:fontRef>
+        </p:style>
+      </p:cxnSp>
+      <p:pic>
+        <p:nvPicPr>
+          <p:cNvPr id="139" name="Picture 138"/>
+          <p:cNvPicPr>
+            <a:picLocks noChangeAspect="1"/>
+          </p:cNvPicPr>
+          <p:nvPr/>
+        </p:nvPicPr>
+        <p:blipFill>
+          <a:blip r:embed="rId7"/>
+          <a:stretch>
+            <a:fillRect/>
+          </a:stretch>
+        </p:blipFill>
+        <p:spPr>
+          <a:xfrm>
+            <a:off x="2838447" y="4765687"/>
+            <a:ext cx="419100" cy="431800"/>
+          </a:xfrm>
+          <a:prstGeom prst="rect">
+            <a:avLst/>
+          </a:prstGeom>
+        </p:spPr>
+      </p:pic>
+      <p:pic>
+        <p:nvPicPr>
+          <p:cNvPr id="140" name="Picture 139"/>
+          <p:cNvPicPr>
+            <a:picLocks noChangeAspect="1"/>
+          </p:cNvPicPr>
+          <p:nvPr/>
+        </p:nvPicPr>
+        <p:blipFill>
+          <a:blip r:embed="rId7"/>
+          <a:stretch>
+            <a:fillRect/>
+          </a:stretch>
+        </p:blipFill>
+        <p:spPr>
+          <a:xfrm>
+            <a:off x="2872551" y="2898790"/>
+            <a:ext cx="419100" cy="431800"/>
+          </a:xfrm>
+          <a:prstGeom prst="rect">
+            <a:avLst/>
+          </a:prstGeom>
+        </p:spPr>
+      </p:pic>
+      <p:pic>
+        <p:nvPicPr>
+          <p:cNvPr id="148" name="Picture 147"/>
+          <p:cNvPicPr>
+            <a:picLocks noChangeAspect="1"/>
+          </p:cNvPicPr>
+          <p:nvPr/>
+        </p:nvPicPr>
+        <p:blipFill>
+          <a:blip r:embed="rId8"/>
+          <a:stretch>
+            <a:fillRect/>
+          </a:stretch>
+        </p:blipFill>
+        <p:spPr>
+          <a:xfrm>
+            <a:off x="7834931" y="3422379"/>
+            <a:ext cx="482600" cy="482600"/>
+          </a:xfrm>
+          <a:prstGeom prst="rect">
+            <a:avLst/>
+          </a:prstGeom>
+        </p:spPr>
+      </p:pic>
+      <p:pic>
+        <p:nvPicPr>
+          <p:cNvPr id="149" name="Picture 148"/>
+          <p:cNvPicPr>
+            <a:picLocks noChangeAspect="1"/>
+          </p:cNvPicPr>
+          <p:nvPr/>
+        </p:nvPicPr>
+        <p:blipFill>
+          <a:blip r:embed="rId9"/>
+          <a:stretch>
+            <a:fillRect/>
+          </a:stretch>
+        </p:blipFill>
+        <p:spPr>
+          <a:xfrm>
+            <a:off x="7353994" y="3466912"/>
+            <a:ext cx="469900" cy="469900"/>
+          </a:xfrm>
+          <a:prstGeom prst="rect">
+            <a:avLst/>
+          </a:prstGeom>
+        </p:spPr>
+      </p:pic>
+      <p:pic>
+        <p:nvPicPr>
+          <p:cNvPr id="150" name="Picture 149"/>
+          <p:cNvPicPr>
+            <a:picLocks noChangeAspect="1"/>
+          </p:cNvPicPr>
+          <p:nvPr/>
+        </p:nvPicPr>
+        <p:blipFill>
+          <a:blip r:embed="rId10"/>
+          <a:stretch>
+            <a:fillRect/>
+          </a:stretch>
+        </p:blipFill>
+        <p:spPr>
+          <a:xfrm>
+            <a:off x="6530322" y="2080506"/>
+            <a:ext cx="444500" cy="444500"/>
+          </a:xfrm>
+          <a:prstGeom prst="rect">
+            <a:avLst/>
+          </a:prstGeom>
+        </p:spPr>
+      </p:pic>
+      <p:pic>
+        <p:nvPicPr>
+          <p:cNvPr id="151" name="Picture 150"/>
+          <p:cNvPicPr>
+            <a:picLocks noChangeAspect="1"/>
+          </p:cNvPicPr>
+          <p:nvPr/>
+        </p:nvPicPr>
+        <p:blipFill>
+          <a:blip r:embed="rId11"/>
+          <a:stretch>
+            <a:fillRect/>
+          </a:stretch>
+        </p:blipFill>
+        <p:spPr>
+          <a:xfrm>
+            <a:off x="4480745" y="1820156"/>
+            <a:ext cx="533400" cy="520700"/>
+          </a:xfrm>
+          <a:prstGeom prst="rect">
+            <a:avLst/>
+          </a:prstGeom>
+        </p:spPr>
+      </p:pic>
+    </p:spTree>
+    <p:extLst>
+      <p:ext uri="{BB962C8B-B14F-4D97-AF65-F5344CB8AC3E}">
+        <p14:creationId xmlns:p14="http://schemas.microsoft.com/office/powerpoint/2010/main" val="40885996"/>
       </p:ext>
     </p:extLst>
   </p:cSld>
@@ -4979,4 +7486,265 @@
     </a:ext>
   </a:extLst>
 </a:theme>
+</file>
+
+<file path=ppt/theme/theme2.xml><?xml version="1.0" encoding="utf-8"?>
+<a:theme xmlns:a="http://schemas.openxmlformats.org/drawingml/2006/main" name="Office Theme">
+  <a:themeElements>
+    <a:clrScheme name="Office">
+      <a:dk1>
+        <a:sysClr val="windowText" lastClr="000000"/>
+      </a:dk1>
+      <a:lt1>
+        <a:sysClr val="window" lastClr="FFFFFF"/>
+      </a:lt1>
+      <a:dk2>
+        <a:srgbClr val="44546A"/>
+      </a:dk2>
+      <a:lt2>
+        <a:srgbClr val="E7E6E6"/>
+      </a:lt2>
+      <a:accent1>
+        <a:srgbClr val="5B9BD5"/>
+      </a:accent1>
+      <a:accent2>
+        <a:srgbClr val="ED7D31"/>
+      </a:accent2>
+      <a:accent3>
+        <a:srgbClr val="A5A5A5"/>
+      </a:accent3>
+      <a:accent4>
+        <a:srgbClr val="FFC000"/>
+      </a:accent4>
+      <a:accent5>
+        <a:srgbClr val="4472C4"/>
+      </a:accent5>
+      <a:accent6>
+        <a:srgbClr val="70AD47"/>
+      </a:accent6>
+      <a:hlink>
+        <a:srgbClr val="0563C1"/>
+      </a:hlink>
+      <a:folHlink>
+        <a:srgbClr val="954F72"/>
+      </a:folHlink>
+    </a:clrScheme>
+    <a:fontScheme name="Office">
+      <a:majorFont>
+        <a:latin typeface="Calibri Light" panose="020F0302020204030204"/>
+        <a:ea typeface=""/>
+        <a:cs typeface=""/>
+        <a:font script="Jpan" typeface="Yu Gothic Light"/>
+        <a:font script="Hang" typeface="맑은 고딕"/>
+        <a:font script="Hans" typeface="DengXian Light"/>
+        <a:font script="Hant" typeface="新細明體"/>
+        <a:font script="Arab" typeface="Times New Roman"/>
+        <a:font script="Hebr" typeface="Times New Roman"/>
+        <a:font script="Thai" typeface="Angsana New"/>
+        <a:font script="Ethi" typeface="Nyala"/>
+        <a:font script="Beng" typeface="Vrinda"/>
+        <a:font script="Gujr" typeface="Shruti"/>
+        <a:font script="Khmr" typeface="MoolBoran"/>
+        <a:font script="Knda" typeface="Tunga"/>
+        <a:font script="Guru" typeface="Raavi"/>
+        <a:font script="Cans" typeface="Euphemia"/>
+        <a:font script="Cher" typeface="Plantagenet Cherokee"/>
+        <a:font script="Yiii" typeface="Microsoft Yi Baiti"/>
+        <a:font script="Tibt" typeface="Microsoft Himalaya"/>
+        <a:font script="Thaa" typeface="MV Boli"/>
+        <a:font script="Deva" typeface="Mangal"/>
+        <a:font script="Telu" typeface="Gautami"/>
+        <a:font script="Taml" typeface="Latha"/>
+        <a:font script="Syrc" typeface="Estrangelo Edessa"/>
+        <a:font script="Orya" typeface="Kalinga"/>
+        <a:font script="Mlym" typeface="Kartika"/>
+        <a:font script="Laoo" typeface="DokChampa"/>
+        <a:font script="Sinh" typeface="Iskoola Pota"/>
+        <a:font script="Mong" typeface="Mongolian Baiti"/>
+        <a:font script="Viet" typeface="Times New Roman"/>
+        <a:font script="Uigh" typeface="Microsoft Uighur"/>
+        <a:font script="Geor" typeface="Sylfaen"/>
+      </a:majorFont>
+      <a:minorFont>
+        <a:latin typeface="Calibri" panose="020F0502020204030204"/>
+        <a:ea typeface=""/>
+        <a:cs typeface=""/>
+        <a:font script="Jpan" typeface="Yu Gothic"/>
+        <a:font script="Hang" typeface="맑은 고딕"/>
+        <a:font script="Hans" typeface="DengXian"/>
+        <a:font script="Hant" typeface="新細明體"/>
+        <a:font script="Arab" typeface="Arial"/>
+        <a:font script="Hebr" typeface="Arial"/>
+        <a:font script="Thai" typeface="Cordia New"/>
+        <a:font script="Ethi" typeface="Nyala"/>
+        <a:font script="Beng" typeface="Vrinda"/>
+        <a:font script="Gujr" typeface="Shruti"/>
+        <a:font script="Khmr" typeface="DaunPenh"/>
+        <a:font script="Knda" typeface="Tunga"/>
+        <a:font script="Guru" typeface="Raavi"/>
+        <a:font script="Cans" typeface="Euphemia"/>
+        <a:font script="Cher" typeface="Plantagenet Cherokee"/>
+        <a:font script="Yiii" typeface="Microsoft Yi Baiti"/>
+        <a:font script="Tibt" typeface="Microsoft Himalaya"/>
+        <a:font script="Thaa" typeface="MV Boli"/>
+        <a:font script="Deva" typeface="Mangal"/>
+        <a:font script="Telu" typeface="Gautami"/>
+        <a:font script="Taml" typeface="Latha"/>
+        <a:font script="Syrc" typeface="Estrangelo Edessa"/>
+        <a:font script="Orya" typeface="Kalinga"/>
+        <a:font script="Mlym" typeface="Kartika"/>
+        <a:font script="Laoo" typeface="DokChampa"/>
+        <a:font script="Sinh" typeface="Iskoola Pota"/>
+        <a:font script="Mong" typeface="Mongolian Baiti"/>
+        <a:font script="Viet" typeface="Arial"/>
+        <a:font script="Uigh" typeface="Microsoft Uighur"/>
+        <a:font script="Geor" typeface="Sylfaen"/>
+      </a:minorFont>
+    </a:fontScheme>
+    <a:fmtScheme name="Office">
+      <a:fillStyleLst>
+        <a:solidFill>
+          <a:schemeClr val="phClr"/>
+        </a:solidFill>
+        <a:gradFill rotWithShape="1">
+          <a:gsLst>
+            <a:gs pos="0">
+              <a:schemeClr val="phClr">
+                <a:lumMod val="110000"/>
+                <a:satMod val="105000"/>
+                <a:tint val="67000"/>
+              </a:schemeClr>
+            </a:gs>
+            <a:gs pos="50000">
+              <a:schemeClr val="phClr">
+                <a:lumMod val="105000"/>
+                <a:satMod val="103000"/>
+                <a:tint val="73000"/>
+              </a:schemeClr>
+            </a:gs>
+            <a:gs pos="100000">
+              <a:schemeClr val="phClr">
+                <a:lumMod val="105000"/>
+                <a:satMod val="109000"/>
+                <a:tint val="81000"/>
+              </a:schemeClr>
+            </a:gs>
+          </a:gsLst>
+          <a:lin ang="5400000" scaled="0"/>
+        </a:gradFill>
+        <a:gradFill rotWithShape="1">
+          <a:gsLst>
+            <a:gs pos="0">
+              <a:schemeClr val="phClr">
+                <a:satMod val="103000"/>
+                <a:lumMod val="102000"/>
+                <a:tint val="94000"/>
+              </a:schemeClr>
+            </a:gs>
+            <a:gs pos="50000">
+              <a:schemeClr val="phClr">
+                <a:satMod val="110000"/>
+                <a:lumMod val="100000"/>
+                <a:shade val="100000"/>
+              </a:schemeClr>
+            </a:gs>
+            <a:gs pos="100000">
+              <a:schemeClr val="phClr">
+                <a:lumMod val="99000"/>
+                <a:satMod val="120000"/>
+                <a:shade val="78000"/>
+              </a:schemeClr>
+            </a:gs>
+          </a:gsLst>
+          <a:lin ang="5400000" scaled="0"/>
+        </a:gradFill>
+      </a:fillStyleLst>
+      <a:lnStyleLst>
+        <a:ln w="6350" cap="flat" cmpd="sng" algn="ctr">
+          <a:solidFill>
+            <a:schemeClr val="phClr"/>
+          </a:solidFill>
+          <a:prstDash val="solid"/>
+          <a:miter lim="800000"/>
+        </a:ln>
+        <a:ln w="12700" cap="flat" cmpd="sng" algn="ctr">
+          <a:solidFill>
+            <a:schemeClr val="phClr"/>
+          </a:solidFill>
+          <a:prstDash val="solid"/>
+          <a:miter lim="800000"/>
+        </a:ln>
+        <a:ln w="19050" cap="flat" cmpd="sng" algn="ctr">
+          <a:solidFill>
+            <a:schemeClr val="phClr"/>
+          </a:solidFill>
+          <a:prstDash val="solid"/>
+          <a:miter lim="800000"/>
+        </a:ln>
+      </a:lnStyleLst>
+      <a:effectStyleLst>
+        <a:effectStyle>
+          <a:effectLst/>
+        </a:effectStyle>
+        <a:effectStyle>
+          <a:effectLst/>
+        </a:effectStyle>
+        <a:effectStyle>
+          <a:effectLst>
+            <a:outerShdw blurRad="57150" dist="19050" dir="5400000" algn="ctr" rotWithShape="0">
+              <a:srgbClr val="000000">
+                <a:alpha val="63000"/>
+              </a:srgbClr>
+            </a:outerShdw>
+          </a:effectLst>
+        </a:effectStyle>
+      </a:effectStyleLst>
+      <a:bgFillStyleLst>
+        <a:solidFill>
+          <a:schemeClr val="phClr"/>
+        </a:solidFill>
+        <a:solidFill>
+          <a:schemeClr val="phClr">
+            <a:tint val="95000"/>
+            <a:satMod val="170000"/>
+          </a:schemeClr>
+        </a:solidFill>
+        <a:gradFill rotWithShape="1">
+          <a:gsLst>
+            <a:gs pos="0">
+              <a:schemeClr val="phClr">
+                <a:tint val="93000"/>
+                <a:satMod val="150000"/>
+                <a:shade val="98000"/>
+                <a:lumMod val="102000"/>
+              </a:schemeClr>
+            </a:gs>
+            <a:gs pos="50000">
+              <a:schemeClr val="phClr">
+                <a:tint val="98000"/>
+                <a:satMod val="130000"/>
+                <a:shade val="90000"/>
+                <a:lumMod val="103000"/>
+              </a:schemeClr>
+            </a:gs>
+            <a:gs pos="100000">
+              <a:schemeClr val="phClr">
+                <a:shade val="63000"/>
+                <a:satMod val="120000"/>
+              </a:schemeClr>
+            </a:gs>
+          </a:gsLst>
+          <a:lin ang="5400000" scaled="0"/>
+        </a:gradFill>
+      </a:bgFillStyleLst>
+    </a:fmtScheme>
+  </a:themeElements>
+  <a:objectDefaults/>
+  <a:extraClrSchemeLst/>
+  <a:extLst>
+    <a:ext uri="{05A4C25C-085E-4340-85A3-A5531E510DB2}">
+      <thm15:themeFamily xmlns:thm15="http://schemas.microsoft.com/office/thememl/2012/main" name="Office Theme" id="{62F939B6-93AF-4DB8-9C6B-D6C7DFDC589F}" vid="{4A3C46E8-61CC-4603-A589-7422A47A8E4A}"/>
+    </a:ext>
+  </a:extLst>
+</a:theme>
 </file>
</xml_diff>